<commit_message>
Updates for branch definitions. Includes Admin and User Guide and testing.
</commit_message>
<xml_diff>
--- a/doc/EMM_GitSystem.pptx
+++ b/doc/EMM_GitSystem.pptx
@@ -5,23 +5,25 @@
     <p:sldMasterId id="2147483660" r:id="rId1"/>
   </p:sldMasterIdLst>
   <p:notesMasterIdLst>
-    <p:notesMasterId r:id="rId16"/>
+    <p:notesMasterId r:id="rId18"/>
   </p:notesMasterIdLst>
   <p:sldIdLst>
     <p:sldId id="257" r:id="rId2"/>
     <p:sldId id="258" r:id="rId3"/>
-    <p:sldId id="311" r:id="rId4"/>
-    <p:sldId id="312" r:id="rId5"/>
-    <p:sldId id="305" r:id="rId6"/>
-    <p:sldId id="310" r:id="rId7"/>
-    <p:sldId id="304" r:id="rId8"/>
-    <p:sldId id="308" r:id="rId9"/>
-    <p:sldId id="314" r:id="rId10"/>
-    <p:sldId id="315" r:id="rId11"/>
-    <p:sldId id="316" r:id="rId12"/>
-    <p:sldId id="306" r:id="rId13"/>
-    <p:sldId id="309" r:id="rId14"/>
-    <p:sldId id="317" r:id="rId15"/>
+    <p:sldId id="309" r:id="rId4"/>
+    <p:sldId id="311" r:id="rId5"/>
+    <p:sldId id="304" r:id="rId6"/>
+    <p:sldId id="312" r:id="rId7"/>
+    <p:sldId id="305" r:id="rId8"/>
+    <p:sldId id="318" r:id="rId9"/>
+    <p:sldId id="310" r:id="rId10"/>
+    <p:sldId id="316" r:id="rId11"/>
+    <p:sldId id="319" r:id="rId12"/>
+    <p:sldId id="308" r:id="rId13"/>
+    <p:sldId id="314" r:id="rId14"/>
+    <p:sldId id="315" r:id="rId15"/>
+    <p:sldId id="306" r:id="rId16"/>
+    <p:sldId id="317" r:id="rId17"/>
   </p:sldIdLst>
   <p:sldSz cx="9144000" cy="6858000" type="screen4x3"/>
   <p:notesSz cx="6950075" cy="9236075"/>
@@ -205,7 +207,7 @@
           <a:p>
             <a:fld id="{596D5604-A1C4-4C80-A284-5145E3AA6E08}" type="datetimeFigureOut">
               <a:rPr lang="en-US" smtClean="0"/>
-              <a:t>10/20/2014</a:t>
+              <a:t>10/22/2014</a:t>
             </a:fld>
             <a:endParaRPr lang="en-US" dirty="0"/>
           </a:p>
@@ -538,7 +540,7 @@
           <a:p>
             <a:fld id="{60130F27-07EF-4ECA-BC3C-C47CEF1B0F2E}" type="slidenum">
               <a:rPr lang="en-US" smtClean="0"/>
-              <a:t>6</a:t>
+              <a:t>9</a:t>
             </a:fld>
             <a:endParaRPr lang="en-US" dirty="0"/>
           </a:p>
@@ -5097,27 +5099,7 @@
                 <a:latin typeface="Calibri" pitchFamily="34" charset="0"/>
                 <a:cs typeface="Calibri" pitchFamily="34" charset="0"/>
               </a:rPr>
-              <a:t>EM&amp;M </a:t>
-            </a:r>
-            <a:r>
-              <a:rPr lang="en-US" sz="3000" dirty="0" err="1" smtClean="0">
-                <a:solidFill>
-                  <a:srgbClr val="00BDEC"/>
-                </a:solidFill>
-                <a:latin typeface="Calibri" pitchFamily="34" charset="0"/>
-                <a:cs typeface="Calibri" pitchFamily="34" charset="0"/>
-              </a:rPr>
-              <a:t>Git</a:t>
-            </a:r>
-            <a:r>
-              <a:rPr lang="en-US" sz="3000" dirty="0" smtClean="0">
-                <a:solidFill>
-                  <a:srgbClr val="00BDEC"/>
-                </a:solidFill>
-                <a:latin typeface="Calibri" pitchFamily="34" charset="0"/>
-                <a:cs typeface="Calibri" pitchFamily="34" charset="0"/>
-              </a:rPr>
-              <a:t> System</a:t>
+              <a:t>EM&amp;M Git System</a:t>
             </a:r>
             <a:endParaRPr lang="en-US" sz="3000" dirty="0">
               <a:solidFill>
@@ -5154,7 +5136,14 @@
                 <a:latin typeface="Calibri" pitchFamily="34" charset="0"/>
                 <a:cs typeface="Calibri" pitchFamily="34" charset="0"/>
               </a:rPr>
-              <a:t>October 21st 2014</a:t>
+              <a:t>October 21st </a:t>
+            </a:r>
+            <a:r>
+              <a:rPr lang="en-US" dirty="0" smtClean="0">
+                <a:latin typeface="Calibri" pitchFamily="34" charset="0"/>
+                <a:cs typeface="Calibri" pitchFamily="34" charset="0"/>
+              </a:rPr>
+              <a:t>2014 (Includes updates recommended at meeting)</a:t>
             </a:r>
             <a:endParaRPr lang="en-US" dirty="0">
               <a:latin typeface="Calibri" pitchFamily="34" charset="0"/>
@@ -5212,64 +5201,418 @@
           <a:chExt cx="0" cy="0"/>
         </a:xfrm>
       </p:grpSpPr>
-      <p:pic>
-        <p:nvPicPr>
-          <p:cNvPr id="3074" name="Picture 2"/>
-          <p:cNvPicPr>
-            <a:picLocks noChangeAspect="1" noChangeArrowheads="1"/>
-          </p:cNvPicPr>
+      <p:sp>
+        <p:nvSpPr>
+          <p:cNvPr id="2" name="Title 1"/>
+          <p:cNvSpPr>
+            <a:spLocks noGrp="1"/>
+          </p:cNvSpPr>
+          <p:nvPr>
+            <p:ph type="title"/>
+          </p:nvPr>
+        </p:nvSpPr>
+        <p:spPr>
+          <a:xfrm>
+            <a:off x="533400" y="332908"/>
+            <a:ext cx="8229600" cy="733892"/>
+          </a:xfrm>
+        </p:spPr>
+        <p:txBody>
+          <a:bodyPr>
+            <a:normAutofit/>
+          </a:bodyPr>
+          <a:lstStyle/>
+          <a:p>
+            <a:pPr lvl="1">
+              <a:spcBef>
+                <a:spcPts val="600"/>
+              </a:spcBef>
+              <a:spcAft>
+                <a:spcPts val="600"/>
+              </a:spcAft>
+            </a:pPr>
+            <a:r>
+              <a:rPr lang="en-US" sz="3600" b="1" kern="1200" dirty="0" smtClean="0">
+                <a:solidFill>
+                  <a:srgbClr val="0070C0"/>
+                </a:solidFill>
+                <a:ea typeface="+mn-ea"/>
+                <a:cs typeface="Calibri" pitchFamily="34" charset="0"/>
+              </a:rPr>
+              <a:t>Proposed Build Identifier</a:t>
+            </a:r>
+            <a:endParaRPr lang="en-US" sz="3600" b="1" kern="1200" dirty="0">
+              <a:solidFill>
+                <a:srgbClr val="0070C0"/>
+              </a:solidFill>
+              <a:ea typeface="+mn-ea"/>
+              <a:cs typeface="Calibri" pitchFamily="34" charset="0"/>
+            </a:endParaRPr>
+          </a:p>
+        </p:txBody>
+      </p:sp>
+      <p:sp>
+        <p:nvSpPr>
+          <p:cNvPr id="3" name="TextBox 2"/>
+          <p:cNvSpPr txBox="1"/>
           <p:nvPr/>
-        </p:nvPicPr>
-        <p:blipFill>
-          <a:blip r:embed="rId2">
-            <a:extLst>
-              <a:ext uri="{28A0092B-C50C-407E-A947-70E740481C1C}">
-                <a14:useLocalDpi xmlns:a14="http://schemas.microsoft.com/office/drawing/2010/main" val="0"/>
-              </a:ext>
-            </a:extLst>
-          </a:blip>
-          <a:srcRect/>
-          <a:stretch>
-            <a:fillRect/>
-          </a:stretch>
-        </p:blipFill>
-        <p:spPr bwMode="auto">
+        </p:nvSpPr>
+        <p:spPr>
           <a:xfrm>
-            <a:off x="367532" y="685801"/>
-            <a:ext cx="8395468" cy="5477612"/>
+            <a:off x="1671308" y="1234619"/>
+            <a:ext cx="5720092" cy="4708981"/>
           </a:xfrm>
           <a:prstGeom prst="rect">
             <a:avLst/>
           </a:prstGeom>
           <a:noFill/>
-          <a:ln>
-            <a:noFill/>
-          </a:ln>
-          <a:extLst>
-            <a:ext uri="{909E8E84-426E-40DD-AFC4-6F175D3DCCD1}">
-              <a14:hiddenFill xmlns:a14="http://schemas.microsoft.com/office/drawing/2010/main">
-                <a:solidFill>
-                  <a:schemeClr val="accent1"/>
-                </a:solidFill>
-              </a14:hiddenFill>
-            </a:ext>
-            <a:ext uri="{91240B29-F687-4F45-9708-019B960494DF}">
-              <a14:hiddenLine xmlns:a14="http://schemas.microsoft.com/office/drawing/2010/main" w="9525">
-                <a:solidFill>
-                  <a:schemeClr val="tx1"/>
-                </a:solidFill>
-                <a:miter lim="800000"/>
-                <a:headEnd/>
-                <a:tailEnd/>
-              </a14:hiddenLine>
-            </a:ext>
-          </a:extLst>
         </p:spPr>
-      </p:pic>
+        <p:txBody>
+          <a:bodyPr wrap="none" rtlCol="0">
+            <a:spAutoFit/>
+          </a:bodyPr>
+          <a:lstStyle/>
+          <a:p>
+            <a:r>
+              <a:rPr lang="en-US" sz="2000" dirty="0" smtClean="0"/>
+              <a:t>Build ID = [repo]-[branch]-[deployment]-[build#]</a:t>
+            </a:r>
+          </a:p>
+          <a:p>
+            <a:endParaRPr lang="en-US" sz="2000" dirty="0"/>
+          </a:p>
+          <a:p>
+            <a:r>
+              <a:rPr lang="en-US" sz="2000" dirty="0">
+                <a:solidFill>
+                  <a:schemeClr val="tx1">
+                    <a:lumMod val="65000"/>
+                    <a:lumOff val="35000"/>
+                  </a:schemeClr>
+                </a:solidFill>
+              </a:rPr>
+              <a:t>r</a:t>
+            </a:r>
+            <a:r>
+              <a:rPr lang="en-US" sz="2000" dirty="0" smtClean="0">
+                <a:solidFill>
+                  <a:schemeClr val="tx1">
+                    <a:lumMod val="65000"/>
+                    <a:lumOff val="35000"/>
+                  </a:schemeClr>
+                </a:solidFill>
+              </a:rPr>
+              <a:t>epo – EM&amp;M Git Repo name</a:t>
+            </a:r>
+          </a:p>
+          <a:p>
+            <a:endParaRPr lang="en-US" sz="2000" dirty="0" smtClean="0">
+              <a:solidFill>
+                <a:schemeClr val="tx1">
+                  <a:lumMod val="65000"/>
+                  <a:lumOff val="35000"/>
+                </a:schemeClr>
+              </a:solidFill>
+            </a:endParaRPr>
+          </a:p>
+          <a:p>
+            <a:r>
+              <a:rPr lang="en-US" sz="2000" dirty="0">
+                <a:solidFill>
+                  <a:schemeClr val="tx1">
+                    <a:lumMod val="65000"/>
+                    <a:lumOff val="35000"/>
+                  </a:schemeClr>
+                </a:solidFill>
+              </a:rPr>
+              <a:t>b</a:t>
+            </a:r>
+            <a:r>
+              <a:rPr lang="en-US" sz="2000" dirty="0" smtClean="0">
+                <a:solidFill>
+                  <a:schemeClr val="tx1">
+                    <a:lumMod val="65000"/>
+                    <a:lumOff val="35000"/>
+                  </a:schemeClr>
+                </a:solidFill>
+              </a:rPr>
+              <a:t>ranch – EM&amp;M Git Repo Branch type, on of:</a:t>
+            </a:r>
+          </a:p>
+          <a:p>
+            <a:pPr lvl="1"/>
+            <a:r>
+              <a:rPr lang="en-US" sz="2000" dirty="0" smtClean="0">
+                <a:solidFill>
+                  <a:schemeClr val="tx1">
+                    <a:lumMod val="65000"/>
+                    <a:lumOff val="35000"/>
+                  </a:schemeClr>
+                </a:solidFill>
+              </a:rPr>
+              <a:t>F – feature branch.</a:t>
+            </a:r>
+          </a:p>
+          <a:p>
+            <a:pPr lvl="1"/>
+            <a:r>
+              <a:rPr lang="en-US" sz="2000" dirty="0" smtClean="0">
+                <a:solidFill>
+                  <a:schemeClr val="tx1">
+                    <a:lumMod val="65000"/>
+                    <a:lumOff val="35000"/>
+                  </a:schemeClr>
+                </a:solidFill>
+              </a:rPr>
+              <a:t>D – develop branch</a:t>
+            </a:r>
+          </a:p>
+          <a:p>
+            <a:pPr lvl="1"/>
+            <a:r>
+              <a:rPr lang="en-US" sz="2000" dirty="0" smtClean="0">
+                <a:solidFill>
+                  <a:schemeClr val="tx1">
+                    <a:lumMod val="65000"/>
+                    <a:lumOff val="35000"/>
+                  </a:schemeClr>
+                </a:solidFill>
+              </a:rPr>
+              <a:t>R – </a:t>
+            </a:r>
+            <a:r>
+              <a:rPr lang="en-US" sz="2000" dirty="0">
+                <a:solidFill>
+                  <a:schemeClr val="tx1">
+                    <a:lumMod val="65000"/>
+                    <a:lumOff val="35000"/>
+                  </a:schemeClr>
+                </a:solidFill>
+              </a:rPr>
+              <a:t>r</a:t>
+            </a:r>
+            <a:r>
+              <a:rPr lang="en-US" sz="2000" dirty="0" smtClean="0">
+                <a:solidFill>
+                  <a:schemeClr val="tx1">
+                    <a:lumMod val="65000"/>
+                    <a:lumOff val="35000"/>
+                  </a:schemeClr>
+                </a:solidFill>
+              </a:rPr>
+              <a:t>elease branch</a:t>
+            </a:r>
+          </a:p>
+          <a:p>
+            <a:pPr lvl="1"/>
+            <a:r>
+              <a:rPr lang="en-US" sz="2000" dirty="0" smtClean="0">
+                <a:solidFill>
+                  <a:schemeClr val="tx1">
+                    <a:lumMod val="65000"/>
+                    <a:lumOff val="35000"/>
+                  </a:schemeClr>
+                </a:solidFill>
+              </a:rPr>
+              <a:t>H – hotfix branch</a:t>
+            </a:r>
+          </a:p>
+          <a:p>
+            <a:pPr lvl="1"/>
+            <a:r>
+              <a:rPr lang="en-US" sz="2000" dirty="0" smtClean="0">
+                <a:solidFill>
+                  <a:schemeClr val="tx1">
+                    <a:lumMod val="65000"/>
+                    <a:lumOff val="35000"/>
+                  </a:schemeClr>
+                </a:solidFill>
+              </a:rPr>
+              <a:t>M – </a:t>
+            </a:r>
+            <a:r>
+              <a:rPr lang="en-US" sz="2000" dirty="0">
+                <a:solidFill>
+                  <a:schemeClr val="tx1">
+                    <a:lumMod val="65000"/>
+                    <a:lumOff val="35000"/>
+                  </a:schemeClr>
+                </a:solidFill>
+              </a:rPr>
+              <a:t>m</a:t>
+            </a:r>
+            <a:r>
+              <a:rPr lang="en-US" sz="2000" dirty="0" smtClean="0">
+                <a:solidFill>
+                  <a:schemeClr val="tx1">
+                    <a:lumMod val="65000"/>
+                    <a:lumOff val="35000"/>
+                  </a:schemeClr>
+                </a:solidFill>
+              </a:rPr>
+              <a:t>aster branch</a:t>
+            </a:r>
+          </a:p>
+          <a:p>
+            <a:pPr lvl="1"/>
+            <a:endParaRPr lang="en-US" sz="2000" dirty="0">
+              <a:solidFill>
+                <a:schemeClr val="tx1">
+                  <a:lumMod val="65000"/>
+                  <a:lumOff val="35000"/>
+                </a:schemeClr>
+              </a:solidFill>
+            </a:endParaRPr>
+          </a:p>
+          <a:p>
+            <a:r>
+              <a:rPr lang="en-US" sz="2000" dirty="0">
+                <a:solidFill>
+                  <a:schemeClr val="tx1">
+                    <a:lumMod val="65000"/>
+                    <a:lumOff val="35000"/>
+                  </a:schemeClr>
+                </a:solidFill>
+              </a:rPr>
+              <a:t>d</a:t>
+            </a:r>
+            <a:r>
+              <a:rPr lang="en-US" sz="2000" dirty="0" smtClean="0">
+                <a:solidFill>
+                  <a:schemeClr val="tx1">
+                    <a:lumMod val="65000"/>
+                    <a:lumOff val="35000"/>
+                  </a:schemeClr>
+                </a:solidFill>
+              </a:rPr>
+              <a:t>eployment – </a:t>
+            </a:r>
+            <a:r>
+              <a:rPr lang="en-US" sz="2000" dirty="0" err="1" smtClean="0">
+                <a:solidFill>
+                  <a:schemeClr val="tx1">
+                    <a:lumMod val="65000"/>
+                    <a:lumOff val="35000"/>
+                  </a:schemeClr>
+                </a:solidFill>
+              </a:rPr>
+              <a:t>M.m</a:t>
+            </a:r>
+            <a:r>
+              <a:rPr lang="en-US" sz="2000" dirty="0" smtClean="0">
+                <a:solidFill>
+                  <a:schemeClr val="tx1">
+                    <a:lumMod val="65000"/>
+                    <a:lumOff val="35000"/>
+                  </a:schemeClr>
+                </a:solidFill>
+              </a:rPr>
+              <a:t> – </a:t>
+            </a:r>
+            <a:r>
+              <a:rPr lang="en-US" sz="2000" dirty="0" err="1" smtClean="0">
+                <a:solidFill>
+                  <a:schemeClr val="tx1">
+                    <a:lumMod val="65000"/>
+                    <a:lumOff val="35000"/>
+                  </a:schemeClr>
+                </a:solidFill>
+              </a:rPr>
+              <a:t>Major.minor</a:t>
+            </a:r>
+            <a:r>
+              <a:rPr lang="en-US" sz="2000" dirty="0" smtClean="0">
+                <a:solidFill>
+                  <a:schemeClr val="tx1">
+                    <a:lumMod val="65000"/>
+                    <a:lumOff val="35000"/>
+                  </a:schemeClr>
+                </a:solidFill>
+              </a:rPr>
+              <a:t> number of repo</a:t>
+            </a:r>
+          </a:p>
+          <a:p>
+            <a:r>
+              <a:rPr lang="en-US" sz="2000" dirty="0" smtClean="0">
+                <a:solidFill>
+                  <a:schemeClr val="tx1">
+                    <a:lumMod val="65000"/>
+                    <a:lumOff val="35000"/>
+                  </a:schemeClr>
+                </a:solidFill>
+              </a:rPr>
+              <a:t>deployment</a:t>
+            </a:r>
+          </a:p>
+          <a:p>
+            <a:pPr lvl="1"/>
+            <a:endParaRPr lang="en-US" sz="2000" dirty="0" smtClean="0">
+              <a:solidFill>
+                <a:schemeClr val="tx1">
+                  <a:lumMod val="65000"/>
+                  <a:lumOff val="35000"/>
+                </a:schemeClr>
+              </a:solidFill>
+            </a:endParaRPr>
+          </a:p>
+          <a:p>
+            <a:r>
+              <a:rPr lang="en-US" sz="2000" dirty="0">
+                <a:solidFill>
+                  <a:schemeClr val="tx1">
+                    <a:lumMod val="65000"/>
+                    <a:lumOff val="35000"/>
+                  </a:schemeClr>
+                </a:solidFill>
+              </a:rPr>
+              <a:t>b</a:t>
+            </a:r>
+            <a:r>
+              <a:rPr lang="en-US" sz="2000" dirty="0" smtClean="0">
+                <a:solidFill>
+                  <a:schemeClr val="tx1">
+                    <a:lumMod val="65000"/>
+                    <a:lumOff val="35000"/>
+                  </a:schemeClr>
+                </a:solidFill>
+              </a:rPr>
+              <a:t>uild# - automatically</a:t>
+            </a:r>
+            <a:r>
+              <a:rPr lang="en-US" sz="2000" dirty="0">
+                <a:solidFill>
+                  <a:schemeClr val="tx1">
+                    <a:lumMod val="65000"/>
+                    <a:lumOff val="35000"/>
+                  </a:schemeClr>
+                </a:solidFill>
+              </a:rPr>
+              <a:t> </a:t>
+            </a:r>
+            <a:r>
+              <a:rPr lang="en-US" sz="2000" dirty="0" smtClean="0">
+                <a:solidFill>
+                  <a:schemeClr val="tx1">
+                    <a:lumMod val="65000"/>
+                    <a:lumOff val="35000"/>
+                  </a:schemeClr>
+                </a:solidFill>
+              </a:rPr>
+              <a:t>generated build increment</a:t>
+            </a:r>
+            <a:r>
+              <a:rPr lang="en-US" sz="1600" dirty="0" smtClean="0"/>
+              <a:t>.</a:t>
+            </a:r>
+            <a:endParaRPr lang="en-US" sz="1600" dirty="0"/>
+          </a:p>
+        </p:txBody>
+      </p:sp>
     </p:spTree>
     <p:extLst>
       <p:ext uri="{BB962C8B-B14F-4D97-AF65-F5344CB8AC3E}">
-        <p14:creationId xmlns:p14="http://schemas.microsoft.com/office/powerpoint/2010/main" val="776527448"/>
+        <p14:creationId xmlns:p14="http://schemas.microsoft.com/office/powerpoint/2010/main" val="3552262932"/>
       </p:ext>
     </p:extLst>
   </p:cSld>
@@ -5374,7 +5717,7 @@
       </p:sp>
       <p:pic>
         <p:nvPicPr>
-          <p:cNvPr id="2050" name="Picture 2"/>
+          <p:cNvPr id="1026" name="Picture 2"/>
           <p:cNvPicPr>
             <a:picLocks noChangeAspect="1" noChangeArrowheads="1"/>
           </p:cNvPicPr>
@@ -5395,8 +5738,8 @@
         </p:blipFill>
         <p:spPr bwMode="auto">
           <a:xfrm>
-            <a:off x="866775" y="1095375"/>
-            <a:ext cx="7410450" cy="5229225"/>
+            <a:off x="892086" y="1143000"/>
+            <a:ext cx="7261314" cy="5318987"/>
           </a:xfrm>
           <a:prstGeom prst="rect">
             <a:avLst/>
@@ -5429,7 +5772,7 @@
     </p:spTree>
     <p:extLst>
       <p:ext uri="{BB962C8B-B14F-4D97-AF65-F5344CB8AC3E}">
-        <p14:creationId xmlns:p14="http://schemas.microsoft.com/office/powerpoint/2010/main" val="3552262932"/>
+        <p14:creationId xmlns:p14="http://schemas.microsoft.com/office/powerpoint/2010/main" val="3813219115"/>
       </p:ext>
     </p:extLst>
   </p:cSld>
@@ -5486,8 +5829,8 @@
         </p:blipFill>
         <p:spPr bwMode="auto">
           <a:xfrm>
-            <a:off x="2209800" y="29688"/>
-            <a:ext cx="4743450" cy="6276975"/>
+            <a:off x="914400" y="286555"/>
+            <a:ext cx="7010399" cy="6023019"/>
           </a:xfrm>
           <a:prstGeom prst="rect">
             <a:avLst/>
@@ -5520,7 +5863,7 @@
     </p:spTree>
     <p:extLst>
       <p:ext uri="{BB962C8B-B14F-4D97-AF65-F5344CB8AC3E}">
-        <p14:creationId xmlns:p14="http://schemas.microsoft.com/office/powerpoint/2010/main" val="952409961"/>
+        <p14:creationId xmlns:p14="http://schemas.microsoft.com/office/powerpoint/2010/main" val="4258256594"/>
       </p:ext>
     </p:extLst>
   </p:cSld>
@@ -5554,141 +5897,64 @@
           <a:chExt cx="0" cy="0"/>
         </a:xfrm>
       </p:grpSpPr>
-      <p:sp>
-        <p:nvSpPr>
-          <p:cNvPr id="2" name="Title 1"/>
-          <p:cNvSpPr>
-            <a:spLocks noGrp="1"/>
-          </p:cNvSpPr>
-          <p:nvPr>
-            <p:ph type="title"/>
-          </p:nvPr>
-        </p:nvSpPr>
-        <p:spPr>
+      <p:pic>
+        <p:nvPicPr>
+          <p:cNvPr id="2" name="Picture 2"/>
+          <p:cNvPicPr>
+            <a:picLocks noChangeAspect="1" noChangeArrowheads="1"/>
+          </p:cNvPicPr>
+          <p:nvPr/>
+        </p:nvPicPr>
+        <p:blipFill>
+          <a:blip r:embed="rId2">
+            <a:extLst>
+              <a:ext uri="{28A0092B-C50C-407E-A947-70E740481C1C}">
+                <a14:useLocalDpi xmlns:a14="http://schemas.microsoft.com/office/drawing/2010/main" val="0"/>
+              </a:ext>
+            </a:extLst>
+          </a:blip>
+          <a:srcRect/>
+          <a:stretch>
+            <a:fillRect/>
+          </a:stretch>
+        </p:blipFill>
+        <p:spPr bwMode="auto">
           <a:xfrm>
-            <a:off x="533400" y="152400"/>
-            <a:ext cx="8229600" cy="733892"/>
+            <a:off x="953181" y="457201"/>
+            <a:ext cx="7276419" cy="5791200"/>
           </a:xfrm>
+          <a:prstGeom prst="rect">
+            <a:avLst/>
+          </a:prstGeom>
+          <a:noFill/>
+          <a:ln>
+            <a:noFill/>
+          </a:ln>
+          <a:extLst>
+            <a:ext uri="{909E8E84-426E-40DD-AFC4-6F175D3DCCD1}">
+              <a14:hiddenFill xmlns:a14="http://schemas.microsoft.com/office/drawing/2010/main">
+                <a:solidFill>
+                  <a:schemeClr val="accent1"/>
+                </a:solidFill>
+              </a14:hiddenFill>
+            </a:ext>
+            <a:ext uri="{91240B29-F687-4F45-9708-019B960494DF}">
+              <a14:hiddenLine xmlns:a14="http://schemas.microsoft.com/office/drawing/2010/main" w="9525">
+                <a:solidFill>
+                  <a:schemeClr val="tx1"/>
+                </a:solidFill>
+                <a:miter lim="800000"/>
+                <a:headEnd/>
+                <a:tailEnd/>
+              </a14:hiddenLine>
+            </a:ext>
+          </a:extLst>
         </p:spPr>
-        <p:txBody>
-          <a:bodyPr>
-            <a:normAutofit/>
-          </a:bodyPr>
-          <a:lstStyle/>
-          <a:p>
-            <a:pPr lvl="1">
-              <a:spcBef>
-                <a:spcPts val="600"/>
-              </a:spcBef>
-              <a:spcAft>
-                <a:spcPts val="600"/>
-              </a:spcAft>
-            </a:pPr>
-            <a:r>
-              <a:rPr lang="en-US" sz="3600" b="1" kern="1200" dirty="0" smtClean="0">
-                <a:solidFill>
-                  <a:srgbClr val="0070C0"/>
-                </a:solidFill>
-                <a:ea typeface="+mn-ea"/>
-                <a:cs typeface="Calibri" pitchFamily="34" charset="0"/>
-              </a:rPr>
-              <a:t>Benefits</a:t>
-            </a:r>
-            <a:endParaRPr lang="en-US" sz="3600" b="1" kern="1200" dirty="0">
-              <a:solidFill>
-                <a:srgbClr val="0070C0"/>
-              </a:solidFill>
-              <a:ea typeface="+mn-ea"/>
-              <a:cs typeface="Calibri" pitchFamily="34" charset="0"/>
-            </a:endParaRPr>
-          </a:p>
-        </p:txBody>
-      </p:sp>
-      <p:sp>
-        <p:nvSpPr>
-          <p:cNvPr id="13" name="Content Placeholder 12"/>
-          <p:cNvSpPr>
-            <a:spLocks noGrp="1"/>
-          </p:cNvSpPr>
-          <p:nvPr>
-            <p:ph idx="1"/>
-          </p:nvPr>
-        </p:nvSpPr>
-        <p:spPr>
-          <a:xfrm>
-            <a:off x="228600" y="838200"/>
-            <a:ext cx="8763000" cy="5410200"/>
-          </a:xfrm>
-        </p:spPr>
-        <p:txBody>
-          <a:bodyPr>
-            <a:noAutofit/>
-          </a:bodyPr>
-          <a:lstStyle/>
-          <a:p>
-            <a:pPr marL="0" indent="0">
-              <a:buNone/>
-            </a:pPr>
-            <a:endParaRPr lang="en-US" sz="1800" dirty="0" smtClean="0"/>
-          </a:p>
-          <a:p>
-            <a:r>
-              <a:rPr lang="en-US" sz="1800" dirty="0" smtClean="0"/>
-              <a:t>The “latest development” and “latest production” is always available to developers to start working from.</a:t>
-            </a:r>
-          </a:p>
-          <a:p>
-            <a:endParaRPr lang="en-US" sz="1800" dirty="0" smtClean="0"/>
-          </a:p>
-          <a:p>
-            <a:r>
-              <a:rPr lang="en-US" sz="1800" dirty="0" smtClean="0"/>
-              <a:t>Developers can maintain “in-progress” work separately from completed, test, and stable code.</a:t>
-            </a:r>
-          </a:p>
-          <a:p>
-            <a:endParaRPr lang="en-US" sz="1800" dirty="0" smtClean="0"/>
-          </a:p>
-          <a:p>
-            <a:r>
-              <a:rPr lang="en-US" sz="1800" dirty="0" smtClean="0"/>
-              <a:t>Provides basis for build and deployment automation.</a:t>
-            </a:r>
-          </a:p>
-          <a:p>
-            <a:endParaRPr lang="en-US" sz="1800" dirty="0" smtClean="0"/>
-          </a:p>
-          <a:p>
-            <a:r>
-              <a:rPr lang="en-US" sz="1800" dirty="0" smtClean="0"/>
-              <a:t>The “latest deployable” is tested and verified with “release” and “hotfix” supporting branches that are temporary and current for Release Management.</a:t>
-            </a:r>
-          </a:p>
-          <a:p>
-            <a:endParaRPr lang="en-US" sz="1800" dirty="0" smtClean="0"/>
-          </a:p>
-          <a:p>
-            <a:r>
-              <a:rPr lang="en-US" sz="1800" dirty="0" smtClean="0"/>
-              <a:t>Repository branches can be used to isolate agile sprint coding sets.</a:t>
-            </a:r>
-          </a:p>
-          <a:p>
-            <a:endParaRPr lang="en-US" sz="1800" dirty="0" smtClean="0"/>
-          </a:p>
-          <a:p>
-            <a:r>
-              <a:rPr lang="en-US" sz="1800" dirty="0" smtClean="0"/>
-              <a:t>Modules can be managed with sets of repos that are baseline deployments.</a:t>
-            </a:r>
-            <a:endParaRPr lang="en-US" sz="1800" dirty="0" smtClean="0"/>
-          </a:p>
-        </p:txBody>
-      </p:sp>
+      </p:pic>
     </p:spTree>
     <p:extLst>
       <p:ext uri="{BB962C8B-B14F-4D97-AF65-F5344CB8AC3E}">
-        <p14:creationId xmlns:p14="http://schemas.microsoft.com/office/powerpoint/2010/main" val="2284605016"/>
+        <p14:creationId xmlns:p14="http://schemas.microsoft.com/office/powerpoint/2010/main" val="3208835640"/>
       </p:ext>
     </p:extLst>
   </p:cSld>
@@ -5722,6 +5988,188 @@
           <a:chExt cx="0" cy="0"/>
         </a:xfrm>
       </p:grpSpPr>
+      <p:pic>
+        <p:nvPicPr>
+          <p:cNvPr id="3074" name="Picture 2"/>
+          <p:cNvPicPr>
+            <a:picLocks noChangeAspect="1" noChangeArrowheads="1"/>
+          </p:cNvPicPr>
+          <p:nvPr/>
+        </p:nvPicPr>
+        <p:blipFill>
+          <a:blip r:embed="rId2">
+            <a:extLst>
+              <a:ext uri="{28A0092B-C50C-407E-A947-70E740481C1C}">
+                <a14:useLocalDpi xmlns:a14="http://schemas.microsoft.com/office/drawing/2010/main" val="0"/>
+              </a:ext>
+            </a:extLst>
+          </a:blip>
+          <a:srcRect/>
+          <a:stretch>
+            <a:fillRect/>
+          </a:stretch>
+        </p:blipFill>
+        <p:spPr bwMode="auto">
+          <a:xfrm>
+            <a:off x="367532" y="685801"/>
+            <a:ext cx="8395468" cy="5477612"/>
+          </a:xfrm>
+          <a:prstGeom prst="rect">
+            <a:avLst/>
+          </a:prstGeom>
+          <a:noFill/>
+          <a:ln>
+            <a:noFill/>
+          </a:ln>
+          <a:extLst>
+            <a:ext uri="{909E8E84-426E-40DD-AFC4-6F175D3DCCD1}">
+              <a14:hiddenFill xmlns:a14="http://schemas.microsoft.com/office/drawing/2010/main">
+                <a:solidFill>
+                  <a:schemeClr val="accent1"/>
+                </a:solidFill>
+              </a14:hiddenFill>
+            </a:ext>
+            <a:ext uri="{91240B29-F687-4F45-9708-019B960494DF}">
+              <a14:hiddenLine xmlns:a14="http://schemas.microsoft.com/office/drawing/2010/main" w="9525">
+                <a:solidFill>
+                  <a:schemeClr val="tx1"/>
+                </a:solidFill>
+                <a:miter lim="800000"/>
+                <a:headEnd/>
+                <a:tailEnd/>
+              </a14:hiddenLine>
+            </a:ext>
+          </a:extLst>
+        </p:spPr>
+      </p:pic>
+    </p:spTree>
+    <p:extLst>
+      <p:ext uri="{BB962C8B-B14F-4D97-AF65-F5344CB8AC3E}">
+        <p14:creationId xmlns:p14="http://schemas.microsoft.com/office/powerpoint/2010/main" val="776527448"/>
+      </p:ext>
+    </p:extLst>
+  </p:cSld>
+  <p:clrMapOvr>
+    <a:masterClrMapping/>
+  </p:clrMapOvr>
+  <p:timing>
+    <p:tnLst>
+      <p:par>
+        <p:cTn id="1" dur="indefinite" restart="never" nodeType="tmRoot"/>
+      </p:par>
+    </p:tnLst>
+  </p:timing>
+</p:sld>
+</file>
+
+<file path=ppt/slides/slide15.xml><?xml version="1.0" encoding="utf-8"?>
+<p:sld xmlns:a="http://schemas.openxmlformats.org/drawingml/2006/main" xmlns:r="http://schemas.openxmlformats.org/officeDocument/2006/relationships" xmlns:p="http://schemas.openxmlformats.org/presentationml/2006/main">
+  <p:cSld>
+    <p:spTree>
+      <p:nvGrpSpPr>
+        <p:cNvPr id="1" name=""/>
+        <p:cNvGrpSpPr/>
+        <p:nvPr/>
+      </p:nvGrpSpPr>
+      <p:grpSpPr>
+        <a:xfrm>
+          <a:off x="0" y="0"/>
+          <a:ext cx="0" cy="0"/>
+          <a:chOff x="0" y="0"/>
+          <a:chExt cx="0" cy="0"/>
+        </a:xfrm>
+      </p:grpSpPr>
+      <p:pic>
+        <p:nvPicPr>
+          <p:cNvPr id="1026" name="Picture 2"/>
+          <p:cNvPicPr>
+            <a:picLocks noChangeAspect="1" noChangeArrowheads="1"/>
+          </p:cNvPicPr>
+          <p:nvPr/>
+        </p:nvPicPr>
+        <p:blipFill>
+          <a:blip r:embed="rId2">
+            <a:extLst>
+              <a:ext uri="{28A0092B-C50C-407E-A947-70E740481C1C}">
+                <a14:useLocalDpi xmlns:a14="http://schemas.microsoft.com/office/drawing/2010/main" val="0"/>
+              </a:ext>
+            </a:extLst>
+          </a:blip>
+          <a:srcRect/>
+          <a:stretch>
+            <a:fillRect/>
+          </a:stretch>
+        </p:blipFill>
+        <p:spPr bwMode="auto">
+          <a:xfrm>
+            <a:off x="2209800" y="29688"/>
+            <a:ext cx="4743450" cy="6276975"/>
+          </a:xfrm>
+          <a:prstGeom prst="rect">
+            <a:avLst/>
+          </a:prstGeom>
+          <a:noFill/>
+          <a:ln>
+            <a:noFill/>
+          </a:ln>
+          <a:extLst>
+            <a:ext uri="{909E8E84-426E-40DD-AFC4-6F175D3DCCD1}">
+              <a14:hiddenFill xmlns:a14="http://schemas.microsoft.com/office/drawing/2010/main">
+                <a:solidFill>
+                  <a:schemeClr val="accent1"/>
+                </a:solidFill>
+              </a14:hiddenFill>
+            </a:ext>
+            <a:ext uri="{91240B29-F687-4F45-9708-019B960494DF}">
+              <a14:hiddenLine xmlns:a14="http://schemas.microsoft.com/office/drawing/2010/main" w="9525">
+                <a:solidFill>
+                  <a:schemeClr val="tx1"/>
+                </a:solidFill>
+                <a:miter lim="800000"/>
+                <a:headEnd/>
+                <a:tailEnd/>
+              </a14:hiddenLine>
+            </a:ext>
+          </a:extLst>
+        </p:spPr>
+      </p:pic>
+    </p:spTree>
+    <p:extLst>
+      <p:ext uri="{BB962C8B-B14F-4D97-AF65-F5344CB8AC3E}">
+        <p14:creationId xmlns:p14="http://schemas.microsoft.com/office/powerpoint/2010/main" val="952409961"/>
+      </p:ext>
+    </p:extLst>
+  </p:cSld>
+  <p:clrMapOvr>
+    <a:masterClrMapping/>
+  </p:clrMapOvr>
+  <p:timing>
+    <p:tnLst>
+      <p:par>
+        <p:cTn id="1" dur="indefinite" restart="never" nodeType="tmRoot"/>
+      </p:par>
+    </p:tnLst>
+  </p:timing>
+</p:sld>
+</file>
+
+<file path=ppt/slides/slide16.xml><?xml version="1.0" encoding="utf-8"?>
+<p:sld xmlns:a="http://schemas.openxmlformats.org/drawingml/2006/main" xmlns:r="http://schemas.openxmlformats.org/officeDocument/2006/relationships" xmlns:p="http://schemas.openxmlformats.org/presentationml/2006/main">
+  <p:cSld>
+    <p:spTree>
+      <p:nvGrpSpPr>
+        <p:cNvPr id="1" name=""/>
+        <p:cNvGrpSpPr/>
+        <p:nvPr/>
+      </p:nvGrpSpPr>
+      <p:grpSpPr>
+        <a:xfrm>
+          <a:off x="0" y="0"/>
+          <a:ext cx="0" cy="0"/>
+          <a:chOff x="0" y="0"/>
+          <a:chExt cx="0" cy="0"/>
+        </a:xfrm>
+      </p:grpSpPr>
       <p:sp>
         <p:nvSpPr>
           <p:cNvPr id="2" name="Title 1"/>
@@ -5735,7 +6183,7 @@
         <p:spPr>
           <a:xfrm>
             <a:off x="533400" y="152400"/>
-            <a:ext cx="8229600" cy="733892"/>
+            <a:ext cx="8229600" cy="1219200"/>
           </a:xfrm>
         </p:spPr>
         <p:txBody>
@@ -5760,7 +6208,36 @@
                 <a:ea typeface="+mn-ea"/>
                 <a:cs typeface="Calibri" pitchFamily="34" charset="0"/>
               </a:rPr>
-              <a:t>Development Challenges</a:t>
+              <a:t>Development </a:t>
+            </a:r>
+            <a:r>
+              <a:rPr lang="en-US" sz="3600" b="1" kern="1200" dirty="0" smtClean="0">
+                <a:solidFill>
+                  <a:srgbClr val="0070C0"/>
+                </a:solidFill>
+                <a:ea typeface="+mn-ea"/>
+                <a:cs typeface="Calibri" pitchFamily="34" charset="0"/>
+              </a:rPr>
+              <a:t>Challenges to</a:t>
+            </a:r>
+            <a:br>
+              <a:rPr lang="en-US" sz="3600" b="1" kern="1200" dirty="0" smtClean="0">
+                <a:solidFill>
+                  <a:srgbClr val="0070C0"/>
+                </a:solidFill>
+                <a:ea typeface="+mn-ea"/>
+                <a:cs typeface="Calibri" pitchFamily="34" charset="0"/>
+              </a:rPr>
+            </a:br>
+            <a:r>
+              <a:rPr lang="en-US" sz="3600" b="1" kern="1200" dirty="0" smtClean="0">
+                <a:solidFill>
+                  <a:srgbClr val="0070C0"/>
+                </a:solidFill>
+                <a:ea typeface="+mn-ea"/>
+                <a:cs typeface="Calibri" pitchFamily="34" charset="0"/>
+              </a:rPr>
+              <a:t>EM&amp;M Git System Branches</a:t>
             </a:r>
             <a:endParaRPr lang="en-US" sz="3600" b="1" kern="1200" dirty="0">
               <a:solidFill>
@@ -5817,15 +6294,7 @@
           <a:p>
             <a:r>
               <a:rPr lang="en-US" sz="1800" dirty="0" smtClean="0"/>
-              <a:t>Retain release </a:t>
-            </a:r>
-            <a:r>
-              <a:rPr lang="en-US" sz="1800" dirty="0" smtClean="0"/>
-              <a:t>b</a:t>
-            </a:r>
-            <a:r>
-              <a:rPr lang="en-US" sz="1800" dirty="0" smtClean="0"/>
-              <a:t>ranches with no “master” production branch.  The “master” branch represents “latest development”.</a:t>
+              <a:t>Retain release branches with no “master” production branch.  The “master” branch represents “latest development”.</a:t>
             </a:r>
           </a:p>
           <a:p>
@@ -5944,8 +6413,8 @@
         </p:nvSpPr>
         <p:spPr>
           <a:xfrm>
-            <a:off x="228600" y="990600"/>
-            <a:ext cx="8763000" cy="5105400"/>
+            <a:off x="2590800" y="990600"/>
+            <a:ext cx="4724400" cy="5105400"/>
           </a:xfrm>
         </p:spPr>
         <p:txBody>
@@ -5956,16 +6425,16 @@
           <a:p>
             <a:pPr lvl="0">
               <a:spcBef>
-                <a:spcPts val="1800"/>
+                <a:spcPts val="1200"/>
               </a:spcBef>
               <a:spcAft>
-                <a:spcPts val="1800"/>
+                <a:spcPts val="1200"/>
               </a:spcAft>
               <a:buFont typeface="+mj-lt"/>
               <a:buAutoNum type="arabicPeriod"/>
             </a:pPr>
             <a:r>
-              <a:rPr lang="en-US" sz="2000" dirty="0" smtClean="0">
+              <a:rPr lang="en-US" sz="1800" dirty="0" smtClean="0">
                 <a:solidFill>
                   <a:srgbClr val="00BDEC"/>
                 </a:solidFill>
@@ -5973,22 +6442,22 @@
                 <a:ea typeface="+mj-ea"/>
                 <a:cs typeface="Calibri" pitchFamily="34" charset="0"/>
               </a:rPr>
-              <a:t>Branches</a:t>
+              <a:t>Benefits</a:t>
             </a:r>
           </a:p>
           <a:p>
             <a:pPr lvl="0">
               <a:spcBef>
-                <a:spcPts val="1800"/>
+                <a:spcPts val="1200"/>
               </a:spcBef>
               <a:spcAft>
-                <a:spcPts val="1800"/>
+                <a:spcPts val="1200"/>
               </a:spcAft>
               <a:buFont typeface="+mj-lt"/>
               <a:buAutoNum type="arabicPeriod"/>
             </a:pPr>
             <a:r>
-              <a:rPr lang="en-US" sz="2000" dirty="0" smtClean="0">
+              <a:rPr lang="en-US" sz="1800" dirty="0" smtClean="0">
                 <a:solidFill>
                   <a:srgbClr val="00BDEC"/>
                 </a:solidFill>
@@ -5996,22 +6465,22 @@
                 <a:ea typeface="+mj-ea"/>
                 <a:cs typeface="Calibri" pitchFamily="34" charset="0"/>
               </a:rPr>
-              <a:t>EM&amp;M Branch Definitions</a:t>
+              <a:t>Branches</a:t>
             </a:r>
           </a:p>
           <a:p>
             <a:pPr lvl="0">
               <a:spcBef>
-                <a:spcPts val="1800"/>
+                <a:spcPts val="1200"/>
               </a:spcBef>
               <a:spcAft>
-                <a:spcPts val="1800"/>
+                <a:spcPts val="1200"/>
               </a:spcAft>
               <a:buFont typeface="+mj-lt"/>
               <a:buAutoNum type="arabicPeriod"/>
             </a:pPr>
             <a:r>
-              <a:rPr lang="en-US" sz="2000" dirty="0" smtClean="0">
+              <a:rPr lang="en-US" sz="1800" dirty="0" smtClean="0">
                 <a:solidFill>
                   <a:srgbClr val="00BDEC"/>
                 </a:solidFill>
@@ -6019,10 +6488,10 @@
                 <a:ea typeface="+mj-ea"/>
                 <a:cs typeface="Calibri" pitchFamily="34" charset="0"/>
               </a:rPr>
-              <a:t>Branching </a:t>
-            </a:r>
-            <a:r>
-              <a:rPr lang="en-US" sz="2000" dirty="0" smtClean="0">
+              <a:t>EM&amp;M Branch </a:t>
+            </a:r>
+            <a:r>
+              <a:rPr lang="en-US" sz="1800" dirty="0" smtClean="0">
                 <a:solidFill>
                   <a:srgbClr val="00BDEC"/>
                 </a:solidFill>
@@ -6030,9 +6499,64 @@
                 <a:ea typeface="+mj-ea"/>
                 <a:cs typeface="Calibri" pitchFamily="34" charset="0"/>
               </a:rPr>
-              <a:t>Approach</a:t>
-            </a:r>
-            <a:endParaRPr lang="en-US" sz="2000" dirty="0" smtClean="0">
+              <a:t>Definitions</a:t>
+            </a:r>
+          </a:p>
+          <a:p>
+            <a:pPr lvl="0">
+              <a:spcBef>
+                <a:spcPts val="1200"/>
+              </a:spcBef>
+              <a:spcAft>
+                <a:spcPts val="1200"/>
+              </a:spcAft>
+              <a:buFont typeface="+mj-lt"/>
+              <a:buAutoNum type="arabicPeriod"/>
+            </a:pPr>
+            <a:r>
+              <a:rPr lang="en-US" sz="1800" dirty="0" smtClean="0">
+                <a:solidFill>
+                  <a:srgbClr val="00BDEC"/>
+                </a:solidFill>
+                <a:latin typeface="Calibri" pitchFamily="34" charset="0"/>
+                <a:ea typeface="+mj-ea"/>
+                <a:cs typeface="Calibri" pitchFamily="34" charset="0"/>
+              </a:rPr>
+              <a:t>Proposed Build Identifier</a:t>
+            </a:r>
+          </a:p>
+          <a:p>
+            <a:pPr>
+              <a:spcBef>
+                <a:spcPts val="1200"/>
+              </a:spcBef>
+              <a:spcAft>
+                <a:spcPts val="1200"/>
+              </a:spcAft>
+              <a:buFont typeface="+mj-lt"/>
+              <a:buAutoNum type="arabicPeriod"/>
+            </a:pPr>
+            <a:r>
+              <a:rPr lang="en-US" sz="1800" dirty="0">
+                <a:solidFill>
+                  <a:srgbClr val="00BDEC"/>
+                </a:solidFill>
+                <a:latin typeface="Calibri" pitchFamily="34" charset="0"/>
+                <a:cs typeface="Calibri" pitchFamily="34" charset="0"/>
+              </a:rPr>
+              <a:t>Information </a:t>
+            </a:r>
+            <a:r>
+              <a:rPr lang="en-US" sz="1800" dirty="0" smtClean="0">
+                <a:solidFill>
+                  <a:srgbClr val="00BDEC"/>
+                </a:solidFill>
+                <a:latin typeface="Calibri" pitchFamily="34" charset="0"/>
+                <a:cs typeface="Calibri" pitchFamily="34" charset="0"/>
+              </a:rPr>
+              <a:t>Conductor</a:t>
+            </a:r>
+            <a:endParaRPr lang="en-US" sz="1800" dirty="0" smtClean="0">
               <a:solidFill>
                 <a:srgbClr val="00BDEC"/>
               </a:solidFill>
@@ -6044,16 +6568,16 @@
           <a:p>
             <a:pPr lvl="0">
               <a:spcBef>
-                <a:spcPts val="1800"/>
+                <a:spcPts val="1200"/>
               </a:spcBef>
               <a:spcAft>
-                <a:spcPts val="1800"/>
+                <a:spcPts val="1200"/>
               </a:spcAft>
               <a:buFont typeface="+mj-lt"/>
               <a:buAutoNum type="arabicPeriod"/>
             </a:pPr>
             <a:r>
-              <a:rPr lang="en-US" sz="2000" dirty="0" smtClean="0">
+              <a:rPr lang="en-US" sz="1800" dirty="0" smtClean="0">
                 <a:solidFill>
                   <a:srgbClr val="00BDEC"/>
                 </a:solidFill>
@@ -6061,10 +6585,10 @@
                 <a:ea typeface="+mj-ea"/>
                 <a:cs typeface="Calibri" pitchFamily="34" charset="0"/>
               </a:rPr>
-              <a:t>Information </a:t>
-            </a:r>
-            <a:r>
-              <a:rPr lang="en-US" sz="2000" dirty="0" smtClean="0">
+              <a:t>Branching </a:t>
+            </a:r>
+            <a:r>
+              <a:rPr lang="en-US" sz="1800" dirty="0" smtClean="0">
                 <a:solidFill>
                   <a:srgbClr val="00BDEC"/>
                 </a:solidFill>
@@ -6072,9 +6596,9 @@
                 <a:ea typeface="+mj-ea"/>
                 <a:cs typeface="Calibri" pitchFamily="34" charset="0"/>
               </a:rPr>
-              <a:t>Conductor</a:t>
-            </a:r>
-            <a:endParaRPr lang="en-US" sz="2000" dirty="0" smtClean="0">
+              <a:t>Approach</a:t>
+            </a:r>
+            <a:endParaRPr lang="en-US" sz="1800" dirty="0" smtClean="0">
               <a:solidFill>
                 <a:srgbClr val="00BDEC"/>
               </a:solidFill>
@@ -6086,16 +6610,16 @@
           <a:p>
             <a:pPr lvl="0">
               <a:spcBef>
-                <a:spcPts val="1800"/>
+                <a:spcPts val="1200"/>
               </a:spcBef>
               <a:spcAft>
-                <a:spcPts val="1800"/>
+                <a:spcPts val="1200"/>
               </a:spcAft>
               <a:buFont typeface="+mj-lt"/>
               <a:buAutoNum type="arabicPeriod"/>
             </a:pPr>
             <a:r>
-              <a:rPr lang="en-US" sz="2000" dirty="0" smtClean="0">
+              <a:rPr lang="en-US" sz="1800" dirty="0" smtClean="0">
                 <a:solidFill>
                   <a:srgbClr val="00BDEC"/>
                 </a:solidFill>
@@ -6103,33 +6627,22 @@
                 <a:ea typeface="+mj-ea"/>
                 <a:cs typeface="Calibri" pitchFamily="34" charset="0"/>
               </a:rPr>
-              <a:t>EM&amp;M </a:t>
-            </a:r>
-            <a:r>
-              <a:rPr lang="en-US" sz="2000" dirty="0" smtClean="0">
-                <a:solidFill>
-                  <a:srgbClr val="00BDEC"/>
-                </a:solidFill>
-                <a:latin typeface="Calibri" pitchFamily="34" charset="0"/>
-                <a:ea typeface="+mj-ea"/>
-                <a:cs typeface="Calibri" pitchFamily="34" charset="0"/>
-              </a:rPr>
-              <a:t>Branching and Merging Workflow</a:t>
+              <a:t>EM&amp;M Branching and Merging Workflow</a:t>
             </a:r>
           </a:p>
           <a:p>
             <a:pPr lvl="0">
               <a:spcBef>
-                <a:spcPts val="1800"/>
+                <a:spcPts val="1200"/>
               </a:spcBef>
               <a:spcAft>
-                <a:spcPts val="1800"/>
+                <a:spcPts val="1200"/>
               </a:spcAft>
               <a:buFont typeface="+mj-lt"/>
               <a:buAutoNum type="arabicPeriod"/>
             </a:pPr>
             <a:r>
-              <a:rPr lang="en-US" sz="2000" dirty="0" smtClean="0">
+              <a:rPr lang="en-US" sz="1800" dirty="0" smtClean="0">
                 <a:solidFill>
                   <a:srgbClr val="00BDEC"/>
                 </a:solidFill>
@@ -6137,39 +6650,8 @@
                 <a:ea typeface="+mj-ea"/>
                 <a:cs typeface="Calibri" pitchFamily="34" charset="0"/>
               </a:rPr>
-              <a:t>Benefits</a:t>
-            </a:r>
-          </a:p>
-          <a:p>
-            <a:pPr lvl="0">
-              <a:spcBef>
-                <a:spcPts val="1800"/>
-              </a:spcBef>
-              <a:spcAft>
-                <a:spcPts val="1800"/>
-              </a:spcAft>
-              <a:buFont typeface="+mj-lt"/>
-              <a:buAutoNum type="arabicPeriod"/>
-            </a:pPr>
-            <a:r>
-              <a:rPr lang="en-US" sz="2000" dirty="0" smtClean="0">
-                <a:solidFill>
-                  <a:srgbClr val="00BDEC"/>
-                </a:solidFill>
-                <a:latin typeface="Calibri" pitchFamily="34" charset="0"/>
-                <a:ea typeface="+mj-ea"/>
-                <a:cs typeface="Calibri" pitchFamily="34" charset="0"/>
-              </a:rPr>
               <a:t>Development Challenges</a:t>
             </a:r>
-            <a:endParaRPr lang="en-US" sz="2000" dirty="0" smtClean="0">
-              <a:solidFill>
-                <a:srgbClr val="00BDEC"/>
-              </a:solidFill>
-              <a:latin typeface="Calibri" pitchFamily="34" charset="0"/>
-              <a:ea typeface="+mj-ea"/>
-              <a:cs typeface="Calibri" pitchFamily="34" charset="0"/>
-            </a:endParaRPr>
           </a:p>
           <a:p>
             <a:pPr marL="0" lvl="0" indent="0">
@@ -6321,7 +6803,7 @@
                 <a:ea typeface="+mn-ea"/>
                 <a:cs typeface="Calibri" pitchFamily="34" charset="0"/>
               </a:rPr>
-              <a:t>Why use a branch?</a:t>
+              <a:t>Benefits</a:t>
             </a:r>
             <a:endParaRPr lang="en-US" sz="3600" b="1" kern="1200" dirty="0">
               <a:solidFill>
@@ -6345,8 +6827,8 @@
         </p:nvSpPr>
         <p:spPr>
           <a:xfrm>
-            <a:off x="990600" y="1600200"/>
-            <a:ext cx="7162800" cy="3886200"/>
+            <a:off x="228600" y="838200"/>
+            <a:ext cx="8763000" cy="5410200"/>
           </a:xfrm>
         </p:spPr>
         <p:txBody>
@@ -6355,165 +6837,68 @@
           </a:bodyPr>
           <a:lstStyle/>
           <a:p>
-            <a:pPr lvl="0">
-              <a:spcBef>
-                <a:spcPts val="1800"/>
-              </a:spcBef>
-              <a:spcAft>
-                <a:spcPts val="1800"/>
-              </a:spcAft>
-              <a:buFont typeface="+mj-lt"/>
-              <a:buAutoNum type="arabicPeriod"/>
-            </a:pPr>
-            <a:r>
-              <a:rPr lang="en-US" sz="2000" dirty="0" smtClean="0">
-                <a:solidFill>
-                  <a:srgbClr val="00BDEC"/>
-                </a:solidFill>
-                <a:latin typeface="Calibri" pitchFamily="34" charset="0"/>
-                <a:ea typeface="+mj-ea"/>
-                <a:cs typeface="Calibri" pitchFamily="34" charset="0"/>
-              </a:rPr>
-              <a:t>To manage release</a:t>
-            </a:r>
-          </a:p>
-          <a:p>
-            <a:pPr lvl="0">
-              <a:spcBef>
-                <a:spcPts val="1800"/>
-              </a:spcBef>
-              <a:spcAft>
-                <a:spcPts val="1800"/>
-              </a:spcAft>
-              <a:buFont typeface="+mj-lt"/>
-              <a:buAutoNum type="arabicPeriod"/>
-            </a:pPr>
-            <a:r>
-              <a:rPr lang="en-US" sz="2000" dirty="0" smtClean="0">
-                <a:solidFill>
-                  <a:srgbClr val="00BDEC"/>
-                </a:solidFill>
-                <a:latin typeface="Calibri" pitchFamily="34" charset="0"/>
-                <a:ea typeface="+mj-ea"/>
-                <a:cs typeface="Calibri" pitchFamily="34" charset="0"/>
-              </a:rPr>
-              <a:t>To develop new features without impacting the main branch</a:t>
-            </a:r>
-          </a:p>
-          <a:p>
-            <a:pPr lvl="0">
-              <a:spcBef>
-                <a:spcPts val="1800"/>
-              </a:spcBef>
-              <a:spcAft>
-                <a:spcPts val="1800"/>
-              </a:spcAft>
-              <a:buFont typeface="+mj-lt"/>
-              <a:buAutoNum type="arabicPeriod"/>
-            </a:pPr>
-            <a:r>
-              <a:rPr lang="en-US" sz="2000" dirty="0" smtClean="0">
-                <a:solidFill>
-                  <a:srgbClr val="00BDEC"/>
-                </a:solidFill>
-                <a:latin typeface="Calibri" pitchFamily="34" charset="0"/>
-                <a:ea typeface="+mj-ea"/>
-                <a:cs typeface="Calibri" pitchFamily="34" charset="0"/>
-              </a:rPr>
-              <a:t>To experiment with a new feature</a:t>
-            </a:r>
-          </a:p>
-          <a:p>
-            <a:pPr lvl="0">
-              <a:spcBef>
-                <a:spcPts val="1800"/>
-              </a:spcBef>
-              <a:spcAft>
-                <a:spcPts val="1800"/>
-              </a:spcAft>
-              <a:buFont typeface="+mj-lt"/>
-              <a:buAutoNum type="arabicPeriod"/>
-            </a:pPr>
-            <a:r>
-              <a:rPr lang="en-US" sz="2000" dirty="0" smtClean="0">
-                <a:solidFill>
-                  <a:srgbClr val="00BDEC"/>
-                </a:solidFill>
-                <a:latin typeface="Calibri" pitchFamily="34" charset="0"/>
-                <a:ea typeface="+mj-ea"/>
-                <a:cs typeface="Calibri" pitchFamily="34" charset="0"/>
-              </a:rPr>
-              <a:t>To create hotfixes to production branches</a:t>
-            </a:r>
-            <a:endParaRPr lang="en-US" sz="2000" dirty="0">
-              <a:solidFill>
-                <a:srgbClr val="00BDEC"/>
-              </a:solidFill>
-              <a:latin typeface="Calibri" pitchFamily="34" charset="0"/>
-              <a:ea typeface="+mj-ea"/>
-              <a:cs typeface="Calibri" pitchFamily="34" charset="0"/>
-            </a:endParaRPr>
-          </a:p>
-          <a:p>
-            <a:pPr lvl="0">
-              <a:spcBef>
-                <a:spcPts val="1800"/>
-              </a:spcBef>
-              <a:spcAft>
-                <a:spcPts val="1800"/>
-              </a:spcAft>
-              <a:buFont typeface="+mj-lt"/>
-              <a:buAutoNum type="arabicPeriod"/>
-            </a:pPr>
-            <a:endParaRPr lang="en-US" sz="2400" dirty="0">
-              <a:solidFill>
-                <a:srgbClr val="00BDEC"/>
-              </a:solidFill>
-              <a:latin typeface="Calibri" pitchFamily="34" charset="0"/>
-              <a:ea typeface="+mj-ea"/>
-              <a:cs typeface="Calibri" pitchFamily="34" charset="0"/>
-            </a:endParaRPr>
-          </a:p>
-          <a:p>
-            <a:pPr marL="0" indent="0">
-              <a:spcBef>
-                <a:spcPct val="0"/>
-              </a:spcBef>
-              <a:buNone/>
-            </a:pPr>
-            <a:endParaRPr lang="en-US" sz="2000" dirty="0">
-              <a:solidFill>
-                <a:srgbClr val="00BDEC"/>
-              </a:solidFill>
-              <a:latin typeface="Calibri" pitchFamily="34" charset="0"/>
-              <a:ea typeface="+mj-ea"/>
-              <a:cs typeface="Calibri" pitchFamily="34" charset="0"/>
-            </a:endParaRPr>
-          </a:p>
-          <a:p>
-            <a:pPr marL="0" indent="0">
-              <a:buNone/>
-            </a:pPr>
-            <a:endParaRPr lang="en-US" sz="1800" dirty="0"/>
-          </a:p>
-          <a:p>
             <a:pPr marL="0" indent="0">
               <a:buNone/>
             </a:pPr>
             <a:endParaRPr lang="en-US" sz="1800" dirty="0" smtClean="0"/>
           </a:p>
           <a:p>
-            <a:pPr marL="0" indent="0">
-              <a:buNone/>
-            </a:pPr>
+            <a:r>
+              <a:rPr lang="en-US" sz="1800" dirty="0" smtClean="0"/>
+              <a:t>The “latest development” and “latest production” is always available to developers to start working from.</a:t>
+            </a:r>
+          </a:p>
+          <a:p>
             <a:endParaRPr lang="en-US" sz="1800" dirty="0" smtClean="0"/>
+          </a:p>
+          <a:p>
+            <a:r>
+              <a:rPr lang="en-US" sz="1800" dirty="0" smtClean="0"/>
+              <a:t>Developers can maintain “in-progress” work separately from completed, test, and stable code.</a:t>
+            </a:r>
+          </a:p>
+          <a:p>
+            <a:endParaRPr lang="en-US" sz="1800" dirty="0" smtClean="0"/>
+          </a:p>
+          <a:p>
+            <a:r>
+              <a:rPr lang="en-US" sz="1800" dirty="0" smtClean="0"/>
+              <a:t>Provides basis for build and deployment automation.</a:t>
+            </a:r>
+          </a:p>
+          <a:p>
+            <a:endParaRPr lang="en-US" sz="1800" dirty="0" smtClean="0"/>
+          </a:p>
+          <a:p>
+            <a:r>
+              <a:rPr lang="en-US" sz="1800" dirty="0" smtClean="0"/>
+              <a:t>The “latest deployable” is tested and verified with “release” and “hotfix” supporting branches that are always current for Release Management.</a:t>
+            </a:r>
+          </a:p>
+          <a:p>
+            <a:endParaRPr lang="en-US" sz="1800" dirty="0" smtClean="0"/>
+          </a:p>
+          <a:p>
+            <a:r>
+              <a:rPr lang="en-US" sz="1800" dirty="0" smtClean="0"/>
+              <a:t>Repository branches can be used to isolate agile sprint coding sets.</a:t>
+            </a:r>
+          </a:p>
+          <a:p>
+            <a:endParaRPr lang="en-US" sz="1800" dirty="0" smtClean="0"/>
+          </a:p>
+          <a:p>
+            <a:r>
+              <a:rPr lang="en-US" sz="1800" dirty="0" smtClean="0"/>
+              <a:t>Modules can be managed with sets of repos that are baseline deployments.</a:t>
+            </a:r>
           </a:p>
         </p:txBody>
       </p:sp>
     </p:spTree>
     <p:extLst>
       <p:ext uri="{BB962C8B-B14F-4D97-AF65-F5344CB8AC3E}">
-        <p14:creationId xmlns:p14="http://schemas.microsoft.com/office/powerpoint/2010/main" val="215319469"/>
+        <p14:creationId xmlns:p14="http://schemas.microsoft.com/office/powerpoint/2010/main" val="2284605016"/>
       </p:ext>
     </p:extLst>
   </p:cSld>
@@ -6585,7 +6970,7 @@
                 <a:ea typeface="+mn-ea"/>
                 <a:cs typeface="Calibri" pitchFamily="34" charset="0"/>
               </a:rPr>
-              <a:t>Branch Types</a:t>
+              <a:t>Why use a branch?</a:t>
             </a:r>
             <a:endParaRPr lang="en-US" sz="3600" b="1" kern="1200" dirty="0">
               <a:solidFill>
@@ -6609,8 +6994,8 @@
         </p:nvSpPr>
         <p:spPr>
           <a:xfrm>
-            <a:off x="1219200" y="1600200"/>
-            <a:ext cx="6629400" cy="3810000"/>
+            <a:off x="990600" y="1295400"/>
+            <a:ext cx="7162800" cy="4572000"/>
           </a:xfrm>
         </p:spPr>
         <p:txBody>
@@ -6619,13 +7004,15 @@
           </a:bodyPr>
           <a:lstStyle/>
           <a:p>
-            <a:pPr>
+            <a:pPr lvl="0">
               <a:spcBef>
                 <a:spcPts val="1800"/>
               </a:spcBef>
               <a:spcAft>
                 <a:spcPts val="1800"/>
               </a:spcAft>
+              <a:buFont typeface="+mj-lt"/>
+              <a:buAutoNum type="arabicPeriod"/>
             </a:pPr>
             <a:r>
               <a:rPr lang="en-US" sz="2000" dirty="0" smtClean="0">
@@ -6636,17 +7023,19 @@
                 <a:ea typeface="+mj-ea"/>
                 <a:cs typeface="Calibri" pitchFamily="34" charset="0"/>
               </a:rPr>
-              <a:t>Master  -  Live site, only push when release is ready.</a:t>
-            </a:r>
-          </a:p>
-          <a:p>
-            <a:pPr>
+              <a:t>To manage release</a:t>
+            </a:r>
+          </a:p>
+          <a:p>
+            <a:pPr lvl="0">
               <a:spcBef>
                 <a:spcPts val="1800"/>
               </a:spcBef>
               <a:spcAft>
                 <a:spcPts val="1800"/>
               </a:spcAft>
+              <a:buFont typeface="+mj-lt"/>
+              <a:buAutoNum type="arabicPeriod"/>
             </a:pPr>
             <a:r>
               <a:rPr lang="en-US" sz="2000" dirty="0" smtClean="0">
@@ -6657,17 +7046,19 @@
                 <a:ea typeface="+mj-ea"/>
                 <a:cs typeface="Calibri" pitchFamily="34" charset="0"/>
               </a:rPr>
-              <a:t>Hotfix  -  Create when a fix is needed on live site.</a:t>
-            </a:r>
-          </a:p>
-          <a:p>
-            <a:pPr>
+              <a:t>To develop new features without impacting the main branch</a:t>
+            </a:r>
+          </a:p>
+          <a:p>
+            <a:pPr lvl="0">
               <a:spcBef>
                 <a:spcPts val="1800"/>
               </a:spcBef>
               <a:spcAft>
                 <a:spcPts val="1800"/>
               </a:spcAft>
+              <a:buFont typeface="+mj-lt"/>
+              <a:buAutoNum type="arabicPeriod"/>
             </a:pPr>
             <a:r>
               <a:rPr lang="en-US" sz="2000" dirty="0" smtClean="0">
@@ -6678,17 +7069,19 @@
                 <a:ea typeface="+mj-ea"/>
                 <a:cs typeface="Calibri" pitchFamily="34" charset="0"/>
               </a:rPr>
-              <a:t>Release  -  Prepare and test before pushing to live.</a:t>
-            </a:r>
-          </a:p>
-          <a:p>
-            <a:pPr>
+              <a:t>To experiment with a new feature</a:t>
+            </a:r>
+          </a:p>
+          <a:p>
+            <a:pPr lvl="0">
               <a:spcBef>
                 <a:spcPts val="1800"/>
               </a:spcBef>
               <a:spcAft>
                 <a:spcPts val="1800"/>
               </a:spcAft>
+              <a:buFont typeface="+mj-lt"/>
+              <a:buAutoNum type="arabicPeriod"/>
             </a:pPr>
             <a:r>
               <a:rPr lang="en-US" sz="2000" dirty="0" smtClean="0">
@@ -6699,17 +7092,30 @@
                 <a:ea typeface="+mj-ea"/>
                 <a:cs typeface="Calibri" pitchFamily="34" charset="0"/>
               </a:rPr>
-              <a:t>Develop  -  Add features and fixes for next release.</a:t>
-            </a:r>
-          </a:p>
-          <a:p>
-            <a:pPr>
+              <a:t>To create hotfixes to production </a:t>
+            </a:r>
+            <a:r>
+              <a:rPr lang="en-US" sz="2000" dirty="0" smtClean="0">
+                <a:solidFill>
+                  <a:srgbClr val="00BDEC"/>
+                </a:solidFill>
+                <a:latin typeface="Calibri" pitchFamily="34" charset="0"/>
+                <a:ea typeface="+mj-ea"/>
+                <a:cs typeface="Calibri" pitchFamily="34" charset="0"/>
+              </a:rPr>
+              <a:t>branches</a:t>
+            </a:r>
+          </a:p>
+          <a:p>
+            <a:pPr lvl="0">
               <a:spcBef>
                 <a:spcPts val="1800"/>
               </a:spcBef>
               <a:spcAft>
                 <a:spcPts val="1800"/>
               </a:spcAft>
+              <a:buFont typeface="+mj-lt"/>
+              <a:buAutoNum type="arabicPeriod"/>
             </a:pPr>
             <a:r>
               <a:rPr lang="en-US" sz="2000" dirty="0" smtClean="0">
@@ -6720,10 +7126,10 @@
                 <a:ea typeface="+mj-ea"/>
                 <a:cs typeface="Calibri" pitchFamily="34" charset="0"/>
               </a:rPr>
-              <a:t>Feature  -  Work on feature outside of main </a:t>
-            </a:r>
-            <a:r>
-              <a:rPr lang="en-US" sz="2000" dirty="0" err="1" smtClean="0">
+              <a:t>To Support separate development efforts with minimum impact to each effor</a:t>
+            </a:r>
+            <a:r>
+              <a:rPr lang="en-US" sz="2000" dirty="0">
                 <a:solidFill>
                   <a:srgbClr val="00BDEC"/>
                 </a:solidFill>
@@ -6731,8 +7137,28 @@
                 <a:ea typeface="+mj-ea"/>
                 <a:cs typeface="Calibri" pitchFamily="34" charset="0"/>
               </a:rPr>
-              <a:t>dev</a:t>
-            </a:r>
+              <a:t>t</a:t>
+            </a:r>
+            <a:endParaRPr lang="en-US" sz="2000" dirty="0" smtClean="0">
+              <a:solidFill>
+                <a:srgbClr val="00BDEC"/>
+              </a:solidFill>
+              <a:latin typeface="Calibri" pitchFamily="34" charset="0"/>
+              <a:ea typeface="+mj-ea"/>
+              <a:cs typeface="Calibri" pitchFamily="34" charset="0"/>
+            </a:endParaRPr>
+          </a:p>
+          <a:p>
+            <a:pPr lvl="0">
+              <a:spcBef>
+                <a:spcPts val="1800"/>
+              </a:spcBef>
+              <a:spcAft>
+                <a:spcPts val="1800"/>
+              </a:spcAft>
+              <a:buFont typeface="+mj-lt"/>
+              <a:buAutoNum type="arabicPeriod"/>
+            </a:pPr>
             <a:r>
               <a:rPr lang="en-US" sz="2000" dirty="0" smtClean="0">
                 <a:solidFill>
@@ -6742,7 +7168,7 @@
                 <a:ea typeface="+mj-ea"/>
                 <a:cs typeface="Calibri" pitchFamily="34" charset="0"/>
               </a:rPr>
-              <a:t> branch.</a:t>
+              <a:t>Provide basis for automated build identifier</a:t>
             </a:r>
             <a:endParaRPr lang="en-US" sz="2000" dirty="0">
               <a:solidFill>
@@ -6812,7 +7238,7 @@
     </p:spTree>
     <p:extLst>
       <p:ext uri="{BB962C8B-B14F-4D97-AF65-F5344CB8AC3E}">
-        <p14:creationId xmlns:p14="http://schemas.microsoft.com/office/powerpoint/2010/main" val="1396122425"/>
+        <p14:creationId xmlns:p14="http://schemas.microsoft.com/office/powerpoint/2010/main" val="215319469"/>
       </p:ext>
     </p:extLst>
   </p:cSld>
@@ -6884,7 +7310,7 @@
                 <a:ea typeface="+mn-ea"/>
                 <a:cs typeface="Calibri" pitchFamily="34" charset="0"/>
               </a:rPr>
-              <a:t>EM&amp;M Branch Definitions</a:t>
+              <a:t>Branching and Merging Anti-Patterns</a:t>
             </a:r>
             <a:endParaRPr lang="en-US" sz="3600" b="1" kern="1200" dirty="0">
               <a:solidFill>
@@ -6973,137 +7399,64 @@
           </a:p>
         </p:txBody>
       </p:sp>
-      <p:sp>
-        <p:nvSpPr>
-          <p:cNvPr id="3" name="TextBox 2"/>
-          <p:cNvSpPr txBox="1"/>
+      <p:pic>
+        <p:nvPicPr>
+          <p:cNvPr id="5122" name="Picture 2"/>
+          <p:cNvPicPr>
+            <a:picLocks noChangeAspect="1" noChangeArrowheads="1"/>
+          </p:cNvPicPr>
           <p:nvPr/>
-        </p:nvSpPr>
-        <p:spPr>
+        </p:nvPicPr>
+        <p:blipFill>
+          <a:blip r:embed="rId2">
+            <a:extLst>
+              <a:ext uri="{28A0092B-C50C-407E-A947-70E740481C1C}">
+                <a14:useLocalDpi xmlns:a14="http://schemas.microsoft.com/office/drawing/2010/main" val="0"/>
+              </a:ext>
+            </a:extLst>
+          </a:blip>
+          <a:srcRect/>
+          <a:stretch>
+            <a:fillRect/>
+          </a:stretch>
+        </p:blipFill>
+        <p:spPr bwMode="auto">
           <a:xfrm>
-            <a:off x="711926" y="1234398"/>
-            <a:ext cx="7543800" cy="5632311"/>
+            <a:off x="71278" y="1676400"/>
+            <a:ext cx="9053128" cy="3276601"/>
           </a:xfrm>
           <a:prstGeom prst="rect">
             <a:avLst/>
           </a:prstGeom>
           <a:noFill/>
+          <a:ln>
+            <a:noFill/>
+          </a:ln>
+          <a:extLst>
+            <a:ext uri="{909E8E84-426E-40DD-AFC4-6F175D3DCCD1}">
+              <a14:hiddenFill xmlns:a14="http://schemas.microsoft.com/office/drawing/2010/main">
+                <a:solidFill>
+                  <a:schemeClr val="accent1"/>
+                </a:solidFill>
+              </a14:hiddenFill>
+            </a:ext>
+            <a:ext uri="{91240B29-F687-4F45-9708-019B960494DF}">
+              <a14:hiddenLine xmlns:a14="http://schemas.microsoft.com/office/drawing/2010/main" w="9525">
+                <a:solidFill>
+                  <a:schemeClr val="tx1"/>
+                </a:solidFill>
+                <a:miter lim="800000"/>
+                <a:headEnd/>
+                <a:tailEnd/>
+              </a14:hiddenLine>
+            </a:ext>
+          </a:extLst>
         </p:spPr>
-        <p:txBody>
-          <a:bodyPr wrap="square" rtlCol="0">
-            <a:spAutoFit/>
-          </a:bodyPr>
-          <a:lstStyle/>
-          <a:p>
-            <a:r>
-              <a:rPr lang="en-US" b="1" dirty="0" smtClean="0"/>
-              <a:t>Main Branch </a:t>
-            </a:r>
-            <a:r>
-              <a:rPr lang="en-US" dirty="0"/>
-              <a:t>-</a:t>
-            </a:r>
-            <a:r>
-              <a:rPr lang="en-US" dirty="0" smtClean="0"/>
-              <a:t> Permanently maintained providing consistent merge points (branch heads). The merge points in the EM&amp;M </a:t>
-            </a:r>
-            <a:r>
-              <a:rPr lang="en-US" dirty="0" err="1" smtClean="0"/>
-              <a:t>Git</a:t>
-            </a:r>
-            <a:r>
-              <a:rPr lang="en-US" dirty="0" smtClean="0"/>
-              <a:t> System are “develop”  (latest development) and “master” (latest production).</a:t>
-            </a:r>
-          </a:p>
-          <a:p>
-            <a:endParaRPr lang="en-US" dirty="0"/>
-          </a:p>
-          <a:p>
-            <a:r>
-              <a:rPr lang="en-US" b="1" dirty="0" smtClean="0"/>
-              <a:t>Supporting Branches </a:t>
-            </a:r>
-            <a:r>
-              <a:rPr lang="en-US" dirty="0"/>
-              <a:t>-</a:t>
-            </a:r>
-            <a:r>
-              <a:rPr lang="en-US" dirty="0" smtClean="0"/>
-              <a:t> Used to code, test, and share code sets for merge to Main Branches.  Temporary in nature since they are removed one merged to the appropriate Main Branches.  There are three types of supporting branches:</a:t>
-            </a:r>
-          </a:p>
-          <a:p>
-            <a:pPr marL="285750" indent="-285750">
-              <a:buFont typeface="Arial" pitchFamily="34" charset="0"/>
-              <a:buChar char="•"/>
-            </a:pPr>
-            <a:r>
-              <a:rPr lang="en-US" b="1" dirty="0" smtClean="0"/>
-              <a:t>Feature</a:t>
-            </a:r>
-            <a:r>
-              <a:rPr lang="en-US" dirty="0" smtClean="0"/>
-              <a:t> - Used by development.  Should branch from develop Main Branch and must merge back to develop Main Branch.</a:t>
-            </a:r>
-          </a:p>
-          <a:p>
-            <a:pPr marL="285750" indent="-285750">
-              <a:buFont typeface="Arial" pitchFamily="34" charset="0"/>
-              <a:buChar char="•"/>
-            </a:pPr>
-            <a:r>
-              <a:rPr lang="en-US" b="1" dirty="0" smtClean="0"/>
-              <a:t>Release</a:t>
-            </a:r>
-            <a:r>
-              <a:rPr lang="en-US" dirty="0" smtClean="0"/>
-              <a:t> - Managed by CM, should branch from develop Main Branch and must merge back into develop and master Main Branches.</a:t>
-            </a:r>
-          </a:p>
-          <a:p>
-            <a:pPr marL="285750" indent="-285750">
-              <a:buFont typeface="Arial" pitchFamily="34" charset="0"/>
-              <a:buChar char="•"/>
-            </a:pPr>
-            <a:r>
-              <a:rPr lang="en-US" b="1" dirty="0" smtClean="0"/>
-              <a:t>Hotfix</a:t>
-            </a:r>
-            <a:r>
-              <a:rPr lang="en-US" dirty="0" smtClean="0"/>
-              <a:t>  - Should branch from master Main Branch.  Must merge back to develop and master branches.  (like EBF)</a:t>
-            </a:r>
-          </a:p>
-          <a:p>
-            <a:pPr marL="285750" indent="-285750">
-              <a:buFont typeface="Arial" pitchFamily="34" charset="0"/>
-              <a:buChar char="•"/>
-            </a:pPr>
-            <a:r>
-              <a:rPr lang="en-US" b="1" dirty="0" smtClean="0"/>
-              <a:t>Development Deployment Branch </a:t>
-            </a:r>
-            <a:r>
-              <a:rPr lang="en-US" dirty="0" smtClean="0"/>
-              <a:t>– Should branch from develop Main Branch.  Must merge bat to develop Main Branch.  This branch has a naming convention of  [module name]_Maj_Min_Dev_Test.</a:t>
-            </a:r>
-          </a:p>
-          <a:p>
-            <a:endParaRPr lang="en-US" dirty="0" smtClean="0"/>
-          </a:p>
-          <a:p>
-            <a:endParaRPr lang="en-US" dirty="0"/>
-          </a:p>
-          <a:p>
-            <a:endParaRPr lang="en-US" dirty="0"/>
-          </a:p>
-        </p:txBody>
-      </p:sp>
+      </p:pic>
     </p:spTree>
     <p:extLst>
       <p:ext uri="{BB962C8B-B14F-4D97-AF65-F5344CB8AC3E}">
-        <p14:creationId xmlns:p14="http://schemas.microsoft.com/office/powerpoint/2010/main" val="1290099490"/>
+        <p14:creationId xmlns:p14="http://schemas.microsoft.com/office/powerpoint/2010/main" val="3207907517"/>
       </p:ext>
     </p:extLst>
   </p:cSld>
@@ -7175,7 +7528,7 @@
                 <a:ea typeface="+mn-ea"/>
                 <a:cs typeface="Calibri" pitchFamily="34" charset="0"/>
               </a:rPr>
-              <a:t>Development Deployment Branches</a:t>
+              <a:t>Branch Types</a:t>
             </a:r>
             <a:endParaRPr lang="en-US" sz="3600" b="1" kern="1200" dirty="0">
               <a:solidFill>
@@ -7199,8 +7552,8 @@
         </p:nvSpPr>
         <p:spPr>
           <a:xfrm>
-            <a:off x="228600" y="1143000"/>
-            <a:ext cx="8763000" cy="5105400"/>
+            <a:off x="1219200" y="1600200"/>
+            <a:ext cx="6629400" cy="3810000"/>
           </a:xfrm>
         </p:spPr>
         <p:txBody>
@@ -7209,6 +7562,161 @@
           </a:bodyPr>
           <a:lstStyle/>
           <a:p>
+            <a:pPr>
+              <a:spcBef>
+                <a:spcPts val="1800"/>
+              </a:spcBef>
+              <a:spcAft>
+                <a:spcPts val="1800"/>
+              </a:spcAft>
+            </a:pPr>
+            <a:r>
+              <a:rPr lang="en-US" sz="2000" dirty="0" smtClean="0">
+                <a:solidFill>
+                  <a:srgbClr val="00BDEC"/>
+                </a:solidFill>
+                <a:latin typeface="Calibri" pitchFamily="34" charset="0"/>
+                <a:ea typeface="+mj-ea"/>
+                <a:cs typeface="Calibri" pitchFamily="34" charset="0"/>
+              </a:rPr>
+              <a:t>Master  -  Live site, only push when release is ready.</a:t>
+            </a:r>
+          </a:p>
+          <a:p>
+            <a:pPr>
+              <a:spcBef>
+                <a:spcPts val="1800"/>
+              </a:spcBef>
+              <a:spcAft>
+                <a:spcPts val="1800"/>
+              </a:spcAft>
+            </a:pPr>
+            <a:r>
+              <a:rPr lang="en-US" sz="2000" dirty="0" smtClean="0">
+                <a:solidFill>
+                  <a:srgbClr val="00BDEC"/>
+                </a:solidFill>
+                <a:latin typeface="Calibri" pitchFamily="34" charset="0"/>
+                <a:ea typeface="+mj-ea"/>
+                <a:cs typeface="Calibri" pitchFamily="34" charset="0"/>
+              </a:rPr>
+              <a:t>Hotfix  -  Create when a fix is needed on live site.</a:t>
+            </a:r>
+          </a:p>
+          <a:p>
+            <a:pPr>
+              <a:spcBef>
+                <a:spcPts val="1800"/>
+              </a:spcBef>
+              <a:spcAft>
+                <a:spcPts val="1800"/>
+              </a:spcAft>
+            </a:pPr>
+            <a:r>
+              <a:rPr lang="en-US" sz="2000" dirty="0" smtClean="0">
+                <a:solidFill>
+                  <a:srgbClr val="00BDEC"/>
+                </a:solidFill>
+                <a:latin typeface="Calibri" pitchFamily="34" charset="0"/>
+                <a:ea typeface="+mj-ea"/>
+                <a:cs typeface="Calibri" pitchFamily="34" charset="0"/>
+              </a:rPr>
+              <a:t>Release  -  Prepare and test before pushing to live.</a:t>
+            </a:r>
+          </a:p>
+          <a:p>
+            <a:pPr>
+              <a:spcBef>
+                <a:spcPts val="1800"/>
+              </a:spcBef>
+              <a:spcAft>
+                <a:spcPts val="1800"/>
+              </a:spcAft>
+            </a:pPr>
+            <a:r>
+              <a:rPr lang="en-US" sz="2000" dirty="0" smtClean="0">
+                <a:solidFill>
+                  <a:srgbClr val="00BDEC"/>
+                </a:solidFill>
+                <a:latin typeface="Calibri" pitchFamily="34" charset="0"/>
+                <a:ea typeface="+mj-ea"/>
+                <a:cs typeface="Calibri" pitchFamily="34" charset="0"/>
+              </a:rPr>
+              <a:t>Develop  -  Add features and fixes for next release.</a:t>
+            </a:r>
+          </a:p>
+          <a:p>
+            <a:pPr>
+              <a:spcBef>
+                <a:spcPts val="1800"/>
+              </a:spcBef>
+              <a:spcAft>
+                <a:spcPts val="1800"/>
+              </a:spcAft>
+            </a:pPr>
+            <a:r>
+              <a:rPr lang="en-US" sz="2000" dirty="0" smtClean="0">
+                <a:solidFill>
+                  <a:srgbClr val="00BDEC"/>
+                </a:solidFill>
+                <a:latin typeface="Calibri" pitchFamily="34" charset="0"/>
+                <a:ea typeface="+mj-ea"/>
+                <a:cs typeface="Calibri" pitchFamily="34" charset="0"/>
+              </a:rPr>
+              <a:t>Feature  -  Work on feature outside of main dev branch.</a:t>
+            </a:r>
+            <a:endParaRPr lang="en-US" sz="2000" dirty="0">
+              <a:solidFill>
+                <a:srgbClr val="00BDEC"/>
+              </a:solidFill>
+              <a:latin typeface="Calibri" pitchFamily="34" charset="0"/>
+              <a:ea typeface="+mj-ea"/>
+              <a:cs typeface="Calibri" pitchFamily="34" charset="0"/>
+            </a:endParaRPr>
+          </a:p>
+          <a:p>
+            <a:pPr lvl="0">
+              <a:spcBef>
+                <a:spcPts val="1800"/>
+              </a:spcBef>
+              <a:spcAft>
+                <a:spcPts val="1800"/>
+              </a:spcAft>
+              <a:buFont typeface="+mj-lt"/>
+              <a:buAutoNum type="arabicPeriod"/>
+            </a:pPr>
+            <a:endParaRPr lang="en-US" sz="2400" dirty="0">
+              <a:solidFill>
+                <a:srgbClr val="00BDEC"/>
+              </a:solidFill>
+              <a:latin typeface="Calibri" pitchFamily="34" charset="0"/>
+              <a:ea typeface="+mj-ea"/>
+              <a:cs typeface="Calibri" pitchFamily="34" charset="0"/>
+            </a:endParaRPr>
+          </a:p>
+          <a:p>
+            <a:pPr marL="0" indent="0">
+              <a:spcBef>
+                <a:spcPct val="0"/>
+              </a:spcBef>
+              <a:buNone/>
+            </a:pPr>
+            <a:endParaRPr lang="en-US" sz="2000" dirty="0">
+              <a:solidFill>
+                <a:srgbClr val="00BDEC"/>
+              </a:solidFill>
+              <a:latin typeface="Calibri" pitchFamily="34" charset="0"/>
+              <a:ea typeface="+mj-ea"/>
+              <a:cs typeface="Calibri" pitchFamily="34" charset="0"/>
+            </a:endParaRPr>
+          </a:p>
+          <a:p>
+            <a:pPr marL="0" indent="0">
+              <a:buNone/>
+            </a:pPr>
+            <a:endParaRPr lang="en-US" sz="1800" dirty="0"/>
+          </a:p>
+          <a:p>
             <a:pPr marL="0" indent="0">
               <a:buNone/>
             </a:pPr>
@@ -7222,64 +7730,10 @@
           </a:p>
         </p:txBody>
       </p:sp>
-      <p:pic>
-        <p:nvPicPr>
-          <p:cNvPr id="9219" name="Picture 3"/>
-          <p:cNvPicPr>
-            <a:picLocks noChangeAspect="1" noChangeArrowheads="1"/>
-          </p:cNvPicPr>
-          <p:nvPr/>
-        </p:nvPicPr>
-        <p:blipFill>
-          <a:blip r:embed="rId3">
-            <a:extLst>
-              <a:ext uri="{28A0092B-C50C-407E-A947-70E740481C1C}">
-                <a14:useLocalDpi xmlns:a14="http://schemas.microsoft.com/office/drawing/2010/main" val="0"/>
-              </a:ext>
-            </a:extLst>
-          </a:blip>
-          <a:srcRect/>
-          <a:stretch>
-            <a:fillRect/>
-          </a:stretch>
-        </p:blipFill>
-        <p:spPr bwMode="auto">
-          <a:xfrm>
-            <a:off x="254662" y="1066800"/>
-            <a:ext cx="8634672" cy="4724399"/>
-          </a:xfrm>
-          <a:prstGeom prst="rect">
-            <a:avLst/>
-          </a:prstGeom>
-          <a:noFill/>
-          <a:ln>
-            <a:noFill/>
-          </a:ln>
-          <a:extLst>
-            <a:ext uri="{909E8E84-426E-40DD-AFC4-6F175D3DCCD1}">
-              <a14:hiddenFill xmlns:a14="http://schemas.microsoft.com/office/drawing/2010/main">
-                <a:solidFill>
-                  <a:schemeClr val="accent1"/>
-                </a:solidFill>
-              </a14:hiddenFill>
-            </a:ext>
-            <a:ext uri="{91240B29-F687-4F45-9708-019B960494DF}">
-              <a14:hiddenLine xmlns:a14="http://schemas.microsoft.com/office/drawing/2010/main" w="9525">
-                <a:solidFill>
-                  <a:schemeClr val="tx1"/>
-                </a:solidFill>
-                <a:miter lim="800000"/>
-                <a:headEnd/>
-                <a:tailEnd/>
-              </a14:hiddenLine>
-            </a:ext>
-          </a:extLst>
-        </p:spPr>
-      </p:pic>
     </p:spTree>
     <p:extLst>
       <p:ext uri="{BB962C8B-B14F-4D97-AF65-F5344CB8AC3E}">
-        <p14:creationId xmlns:p14="http://schemas.microsoft.com/office/powerpoint/2010/main" val="3633740265"/>
+        <p14:creationId xmlns:p14="http://schemas.microsoft.com/office/powerpoint/2010/main" val="1396122425"/>
       </p:ext>
     </p:extLst>
   </p:cSld>
@@ -7351,7 +7805,7 @@
                 <a:ea typeface="+mn-ea"/>
                 <a:cs typeface="Calibri" pitchFamily="34" charset="0"/>
               </a:rPr>
-              <a:t>Branching and Merging Anti-Patterns</a:t>
+              <a:t>EM&amp;M Branch Definitions</a:t>
             </a:r>
             <a:endParaRPr lang="en-US" sz="3600" b="1" kern="1200" dirty="0">
               <a:solidFill>
@@ -7440,64 +7894,245 @@
           </a:p>
         </p:txBody>
       </p:sp>
-      <p:pic>
-        <p:nvPicPr>
-          <p:cNvPr id="5122" name="Picture 2"/>
-          <p:cNvPicPr>
-            <a:picLocks noChangeAspect="1" noChangeArrowheads="1"/>
-          </p:cNvPicPr>
+      <p:sp>
+        <p:nvSpPr>
+          <p:cNvPr id="3" name="TextBox 2"/>
+          <p:cNvSpPr txBox="1"/>
           <p:nvPr/>
-        </p:nvPicPr>
-        <p:blipFill>
-          <a:blip r:embed="rId2">
-            <a:extLst>
-              <a:ext uri="{28A0092B-C50C-407E-A947-70E740481C1C}">
-                <a14:useLocalDpi xmlns:a14="http://schemas.microsoft.com/office/drawing/2010/main" val="0"/>
-              </a:ext>
-            </a:extLst>
-          </a:blip>
-          <a:srcRect/>
-          <a:stretch>
-            <a:fillRect/>
-          </a:stretch>
-        </p:blipFill>
-        <p:spPr bwMode="auto">
+        </p:nvSpPr>
+        <p:spPr>
           <a:xfrm>
-            <a:off x="71278" y="1676400"/>
-            <a:ext cx="9053128" cy="3276601"/>
+            <a:off x="711926" y="1194021"/>
+            <a:ext cx="7543800" cy="5632311"/>
           </a:xfrm>
           <a:prstGeom prst="rect">
             <a:avLst/>
           </a:prstGeom>
           <a:noFill/>
-          <a:ln>
-            <a:noFill/>
-          </a:ln>
-          <a:extLst>
-            <a:ext uri="{909E8E84-426E-40DD-AFC4-6F175D3DCCD1}">
-              <a14:hiddenFill xmlns:a14="http://schemas.microsoft.com/office/drawing/2010/main">
-                <a:solidFill>
-                  <a:schemeClr val="accent1"/>
-                </a:solidFill>
-              </a14:hiddenFill>
-            </a:ext>
-            <a:ext uri="{91240B29-F687-4F45-9708-019B960494DF}">
-              <a14:hiddenLine xmlns:a14="http://schemas.microsoft.com/office/drawing/2010/main" w="9525">
-                <a:solidFill>
-                  <a:schemeClr val="tx1"/>
-                </a:solidFill>
-                <a:miter lim="800000"/>
-                <a:headEnd/>
-                <a:tailEnd/>
-              </a14:hiddenLine>
-            </a:ext>
-          </a:extLst>
         </p:spPr>
-      </p:pic>
+        <p:txBody>
+          <a:bodyPr wrap="square" rtlCol="0">
+            <a:spAutoFit/>
+          </a:bodyPr>
+          <a:lstStyle/>
+          <a:p>
+            <a:r>
+              <a:rPr lang="en-US" b="1" dirty="0" smtClean="0">
+                <a:solidFill>
+                  <a:srgbClr val="006600"/>
+                </a:solidFill>
+              </a:rPr>
+              <a:t>Main Branch </a:t>
+            </a:r>
+            <a:r>
+              <a:rPr lang="en-US" dirty="0"/>
+              <a:t>-</a:t>
+            </a:r>
+            <a:r>
+              <a:rPr lang="en-US" dirty="0" smtClean="0"/>
+              <a:t> </a:t>
+            </a:r>
+            <a:r>
+              <a:rPr lang="en-US" dirty="0" smtClean="0">
+                <a:solidFill>
+                  <a:schemeClr val="tx1">
+                    <a:lumMod val="75000"/>
+                    <a:lumOff val="25000"/>
+                  </a:schemeClr>
+                </a:solidFill>
+              </a:rPr>
+              <a:t>Permanently maintained providing consistent merge points (branch heads). The merge points in the EM&amp;M Git System are “develop”  (latest development) and “master” (latest production</a:t>
+            </a:r>
+            <a:r>
+              <a:rPr lang="en-US" dirty="0" smtClean="0">
+                <a:solidFill>
+                  <a:schemeClr val="tx1">
+                    <a:lumMod val="75000"/>
+                    <a:lumOff val="25000"/>
+                  </a:schemeClr>
+                </a:solidFill>
+              </a:rPr>
+              <a:t>).</a:t>
+            </a:r>
+          </a:p>
+          <a:p>
+            <a:endParaRPr lang="en-US" dirty="0">
+              <a:solidFill>
+                <a:schemeClr val="tx1">
+                  <a:lumMod val="75000"/>
+                  <a:lumOff val="25000"/>
+                </a:schemeClr>
+              </a:solidFill>
+            </a:endParaRPr>
+          </a:p>
+          <a:p>
+            <a:r>
+              <a:rPr lang="en-US" dirty="0">
+                <a:solidFill>
+                  <a:schemeClr val="tx1">
+                    <a:lumMod val="75000"/>
+                    <a:lumOff val="25000"/>
+                  </a:schemeClr>
+                </a:solidFill>
+              </a:rPr>
+              <a:t>When merging to these main branches code is buildable and deployable. The “develop” branch head represents code that will automatically build and deploy to the development environment.</a:t>
+            </a:r>
+          </a:p>
+          <a:p>
+            <a:endParaRPr lang="en-US" dirty="0">
+              <a:solidFill>
+                <a:schemeClr val="tx1">
+                  <a:lumMod val="75000"/>
+                  <a:lumOff val="25000"/>
+                </a:schemeClr>
+              </a:solidFill>
+            </a:endParaRPr>
+          </a:p>
+          <a:p>
+            <a:r>
+              <a:rPr lang="en-US" dirty="0">
+                <a:solidFill>
+                  <a:schemeClr val="tx1">
+                    <a:lumMod val="75000"/>
+                    <a:lumOff val="25000"/>
+                  </a:schemeClr>
+                </a:solidFill>
+              </a:rPr>
+              <a:t>The “master” branch head represents code that will automatically build and produce deployable </a:t>
+            </a:r>
+            <a:r>
+              <a:rPr lang="en-US" dirty="0" smtClean="0">
+                <a:solidFill>
+                  <a:schemeClr val="tx1">
+                    <a:lumMod val="75000"/>
+                    <a:lumOff val="25000"/>
+                  </a:schemeClr>
+                </a:solidFill>
+              </a:rPr>
+              <a:t>elements. These </a:t>
+            </a:r>
+            <a:r>
+              <a:rPr lang="en-US" dirty="0">
+                <a:solidFill>
+                  <a:schemeClr val="tx1">
+                    <a:lumMod val="75000"/>
+                    <a:lumOff val="25000"/>
+                  </a:schemeClr>
+                </a:solidFill>
+              </a:rPr>
+              <a:t>elements </a:t>
+            </a:r>
+            <a:r>
+              <a:rPr lang="en-US" dirty="0" smtClean="0">
+                <a:solidFill>
+                  <a:schemeClr val="tx1">
+                    <a:lumMod val="75000"/>
+                    <a:lumOff val="25000"/>
+                  </a:schemeClr>
+                </a:solidFill>
+              </a:rPr>
+              <a:t>are deployed, </a:t>
+            </a:r>
+            <a:r>
+              <a:rPr lang="en-US" dirty="0">
+                <a:solidFill>
+                  <a:schemeClr val="tx1">
+                    <a:lumMod val="75000"/>
+                    <a:lumOff val="25000"/>
+                  </a:schemeClr>
+                </a:solidFill>
+              </a:rPr>
+              <a:t>on demand, to </a:t>
+            </a:r>
+            <a:r>
+              <a:rPr lang="en-US" dirty="0" smtClean="0">
+                <a:solidFill>
+                  <a:schemeClr val="tx1">
+                    <a:lumMod val="75000"/>
+                    <a:lumOff val="25000"/>
+                  </a:schemeClr>
+                </a:solidFill>
+              </a:rPr>
+              <a:t>QA by the CM staff. The EPA staff deploys these elements, on demand to </a:t>
+            </a:r>
+            <a:r>
+              <a:rPr lang="en-US" dirty="0">
+                <a:solidFill>
+                  <a:schemeClr val="tx1">
+                    <a:lumMod val="75000"/>
+                    <a:lumOff val="25000"/>
+                  </a:schemeClr>
+                </a:solidFill>
+              </a:rPr>
+              <a:t>Integration, Stage, and Production </a:t>
+            </a:r>
+            <a:r>
+              <a:rPr lang="en-US" dirty="0" smtClean="0">
+                <a:solidFill>
+                  <a:schemeClr val="tx1">
+                    <a:lumMod val="75000"/>
+                    <a:lumOff val="25000"/>
+                  </a:schemeClr>
+                </a:solidFill>
+              </a:rPr>
+              <a:t>environments. </a:t>
+            </a:r>
+            <a:endParaRPr lang="en-US" dirty="0">
+              <a:solidFill>
+                <a:schemeClr val="tx1">
+                  <a:lumMod val="75000"/>
+                  <a:lumOff val="25000"/>
+                </a:schemeClr>
+              </a:solidFill>
+            </a:endParaRPr>
+          </a:p>
+          <a:p>
+            <a:endParaRPr lang="en-US" dirty="0"/>
+          </a:p>
+          <a:p>
+            <a:r>
+              <a:rPr lang="en-US" b="1" dirty="0" smtClean="0">
+                <a:solidFill>
+                  <a:srgbClr val="006600"/>
+                </a:solidFill>
+              </a:rPr>
+              <a:t>Supporting Branches </a:t>
+            </a:r>
+            <a:r>
+              <a:rPr lang="en-US" dirty="0"/>
+              <a:t>-</a:t>
+            </a:r>
+            <a:r>
+              <a:rPr lang="en-US" dirty="0" smtClean="0"/>
+              <a:t> </a:t>
+            </a:r>
+            <a:r>
+              <a:rPr lang="en-US" dirty="0">
+                <a:solidFill>
+                  <a:schemeClr val="tx1">
+                    <a:lumMod val="75000"/>
+                    <a:lumOff val="25000"/>
+                  </a:schemeClr>
+                </a:solidFill>
+              </a:rPr>
+              <a:t>Used to code, test, and share code sets for merge to Main Branches.  Temporary in nature since they are removed one merged to the appropriate Main Branches. There are three types of supporting branches.</a:t>
+            </a:r>
+          </a:p>
+          <a:p>
+            <a:endParaRPr lang="en-US" dirty="0" smtClean="0"/>
+          </a:p>
+          <a:p>
+            <a:endParaRPr lang="en-US" dirty="0"/>
+          </a:p>
+          <a:p>
+            <a:endParaRPr lang="en-US" dirty="0"/>
+          </a:p>
+        </p:txBody>
+      </p:sp>
     </p:spTree>
     <p:extLst>
       <p:ext uri="{BB962C8B-B14F-4D97-AF65-F5344CB8AC3E}">
-        <p14:creationId xmlns:p14="http://schemas.microsoft.com/office/powerpoint/2010/main" val="3207907517"/>
+        <p14:creationId xmlns:p14="http://schemas.microsoft.com/office/powerpoint/2010/main" val="1290099490"/>
       </p:ext>
     </p:extLst>
   </p:cSld>
@@ -7531,64 +8166,499 @@
           <a:chExt cx="0" cy="0"/>
         </a:xfrm>
       </p:grpSpPr>
-      <p:pic>
-        <p:nvPicPr>
-          <p:cNvPr id="1026" name="Picture 2"/>
-          <p:cNvPicPr>
-            <a:picLocks noChangeAspect="1" noChangeArrowheads="1"/>
-          </p:cNvPicPr>
+      <p:sp>
+        <p:nvSpPr>
+          <p:cNvPr id="2" name="Title 1"/>
+          <p:cNvSpPr>
+            <a:spLocks noGrp="1"/>
+          </p:cNvSpPr>
+          <p:nvPr>
+            <p:ph type="title"/>
+          </p:nvPr>
+        </p:nvSpPr>
+        <p:spPr>
+          <a:xfrm>
+            <a:off x="533400" y="152400"/>
+            <a:ext cx="8229600" cy="733892"/>
+          </a:xfrm>
+        </p:spPr>
+        <p:txBody>
+          <a:bodyPr>
+            <a:normAutofit/>
+          </a:bodyPr>
+          <a:lstStyle/>
+          <a:p>
+            <a:pPr lvl="1">
+              <a:spcBef>
+                <a:spcPts val="600"/>
+              </a:spcBef>
+              <a:spcAft>
+                <a:spcPts val="600"/>
+              </a:spcAft>
+            </a:pPr>
+            <a:r>
+              <a:rPr lang="en-US" sz="3600" b="1" kern="1200" dirty="0" smtClean="0">
+                <a:solidFill>
+                  <a:srgbClr val="0070C0"/>
+                </a:solidFill>
+                <a:ea typeface="+mn-ea"/>
+                <a:cs typeface="Calibri" pitchFamily="34" charset="0"/>
+              </a:rPr>
+              <a:t>EM&amp;M </a:t>
+            </a:r>
+            <a:r>
+              <a:rPr lang="en-US" sz="3600" b="1" kern="1200" dirty="0" smtClean="0">
+                <a:solidFill>
+                  <a:srgbClr val="0070C0"/>
+                </a:solidFill>
+                <a:ea typeface="+mn-ea"/>
+                <a:cs typeface="Calibri" pitchFamily="34" charset="0"/>
+              </a:rPr>
+              <a:t>Supporting Branches</a:t>
+            </a:r>
+            <a:endParaRPr lang="en-US" sz="3600" b="1" kern="1200" dirty="0">
+              <a:solidFill>
+                <a:srgbClr val="0070C0"/>
+              </a:solidFill>
+              <a:ea typeface="+mn-ea"/>
+              <a:cs typeface="Calibri" pitchFamily="34" charset="0"/>
+            </a:endParaRPr>
+          </a:p>
+        </p:txBody>
+      </p:sp>
+      <p:sp>
+        <p:nvSpPr>
+          <p:cNvPr id="13" name="Content Placeholder 12"/>
+          <p:cNvSpPr>
+            <a:spLocks noGrp="1"/>
+          </p:cNvSpPr>
+          <p:nvPr>
+            <p:ph idx="1"/>
+          </p:nvPr>
+        </p:nvSpPr>
+        <p:spPr>
+          <a:xfrm>
+            <a:off x="228600" y="990600"/>
+            <a:ext cx="8763000" cy="5257800"/>
+          </a:xfrm>
+        </p:spPr>
+        <p:txBody>
+          <a:bodyPr>
+            <a:noAutofit/>
+          </a:bodyPr>
+          <a:lstStyle/>
+          <a:p>
+            <a:pPr lvl="0">
+              <a:spcBef>
+                <a:spcPts val="1800"/>
+              </a:spcBef>
+              <a:spcAft>
+                <a:spcPts val="1800"/>
+              </a:spcAft>
+              <a:buFont typeface="+mj-lt"/>
+              <a:buAutoNum type="arabicPeriod"/>
+            </a:pPr>
+            <a:endParaRPr lang="en-US" sz="2400" dirty="0">
+              <a:solidFill>
+                <a:srgbClr val="00BDEC"/>
+              </a:solidFill>
+              <a:latin typeface="Calibri" pitchFamily="34" charset="0"/>
+              <a:ea typeface="+mj-ea"/>
+              <a:cs typeface="Calibri" pitchFamily="34" charset="0"/>
+            </a:endParaRPr>
+          </a:p>
+          <a:p>
+            <a:pPr marL="0" indent="0">
+              <a:spcBef>
+                <a:spcPct val="0"/>
+              </a:spcBef>
+              <a:buNone/>
+            </a:pPr>
+            <a:endParaRPr lang="en-US" sz="2000" dirty="0">
+              <a:solidFill>
+                <a:srgbClr val="00BDEC"/>
+              </a:solidFill>
+              <a:latin typeface="Calibri" pitchFamily="34" charset="0"/>
+              <a:ea typeface="+mj-ea"/>
+              <a:cs typeface="Calibri" pitchFamily="34" charset="0"/>
+            </a:endParaRPr>
+          </a:p>
+          <a:p>
+            <a:pPr marL="0" indent="0">
+              <a:buNone/>
+            </a:pPr>
+            <a:endParaRPr lang="en-US" sz="1800" dirty="0"/>
+          </a:p>
+          <a:p>
+            <a:pPr marL="0" indent="0">
+              <a:buNone/>
+            </a:pPr>
+            <a:endParaRPr lang="en-US" sz="1800" dirty="0" smtClean="0"/>
+          </a:p>
+          <a:p>
+            <a:pPr marL="0" indent="0">
+              <a:buNone/>
+            </a:pPr>
+            <a:endParaRPr lang="en-US" sz="1800" dirty="0" smtClean="0"/>
+          </a:p>
+        </p:txBody>
+      </p:sp>
+      <p:sp>
+        <p:nvSpPr>
+          <p:cNvPr id="3" name="TextBox 2"/>
+          <p:cNvSpPr txBox="1"/>
           <p:nvPr/>
-        </p:nvPicPr>
-        <p:blipFill>
-          <a:blip r:embed="rId2">
-            <a:extLst>
-              <a:ext uri="{28A0092B-C50C-407E-A947-70E740481C1C}">
-                <a14:useLocalDpi xmlns:a14="http://schemas.microsoft.com/office/drawing/2010/main" val="0"/>
-              </a:ext>
-            </a:extLst>
-          </a:blip>
-          <a:srcRect/>
-          <a:stretch>
-            <a:fillRect/>
-          </a:stretch>
-        </p:blipFill>
-        <p:spPr bwMode="auto">
+        </p:nvSpPr>
+        <p:spPr>
           <a:xfrm>
-            <a:off x="914400" y="286555"/>
-            <a:ext cx="7010399" cy="6023019"/>
+            <a:off x="711926" y="1079242"/>
+            <a:ext cx="7543800" cy="4770537"/>
           </a:xfrm>
           <a:prstGeom prst="rect">
             <a:avLst/>
           </a:prstGeom>
           <a:noFill/>
-          <a:ln>
-            <a:noFill/>
-          </a:ln>
-          <a:extLst>
-            <a:ext uri="{909E8E84-426E-40DD-AFC4-6F175D3DCCD1}">
-              <a14:hiddenFill xmlns:a14="http://schemas.microsoft.com/office/drawing/2010/main">
-                <a:solidFill>
-                  <a:schemeClr val="accent1"/>
-                </a:solidFill>
-              </a14:hiddenFill>
-            </a:ext>
-            <a:ext uri="{91240B29-F687-4F45-9708-019B960494DF}">
-              <a14:hiddenLine xmlns:a14="http://schemas.microsoft.com/office/drawing/2010/main" w="9525">
-                <a:solidFill>
-                  <a:schemeClr val="tx1"/>
-                </a:solidFill>
-                <a:miter lim="800000"/>
-                <a:headEnd/>
-                <a:tailEnd/>
-              </a14:hiddenLine>
-            </a:ext>
-          </a:extLst>
         </p:spPr>
-      </p:pic>
+        <p:txBody>
+          <a:bodyPr wrap="square" rtlCol="0">
+            <a:spAutoFit/>
+          </a:bodyPr>
+          <a:lstStyle/>
+          <a:p>
+            <a:pPr marL="285750" indent="-285750">
+              <a:buFont typeface="Arial" pitchFamily="34" charset="0"/>
+              <a:buChar char="•"/>
+            </a:pPr>
+            <a:r>
+              <a:rPr lang="en-US" sz="1600" b="1" dirty="0" smtClean="0"/>
+              <a:t>Feature</a:t>
+            </a:r>
+            <a:r>
+              <a:rPr lang="en-US" sz="1600" dirty="0" smtClean="0"/>
+              <a:t> </a:t>
+            </a:r>
+            <a:r>
+              <a:rPr lang="en-US" sz="1600" dirty="0" smtClean="0"/>
+              <a:t>- </a:t>
+            </a:r>
+            <a:r>
+              <a:rPr lang="en-US" sz="1600" dirty="0" smtClean="0">
+                <a:solidFill>
+                  <a:schemeClr val="tx1">
+                    <a:lumMod val="75000"/>
+                    <a:lumOff val="25000"/>
+                  </a:schemeClr>
+                </a:solidFill>
+              </a:rPr>
+              <a:t>Used by </a:t>
+            </a:r>
+            <a:r>
+              <a:rPr lang="en-US" sz="1600" dirty="0" smtClean="0">
+                <a:solidFill>
+                  <a:schemeClr val="tx1">
+                    <a:lumMod val="75000"/>
+                    <a:lumOff val="25000"/>
+                  </a:schemeClr>
+                </a:solidFill>
+              </a:rPr>
+              <a:t>development for all development tasks. Should </a:t>
+            </a:r>
+            <a:r>
+              <a:rPr lang="en-US" sz="1600" dirty="0" smtClean="0">
+                <a:solidFill>
+                  <a:schemeClr val="tx1">
+                    <a:lumMod val="75000"/>
+                    <a:lumOff val="25000"/>
+                  </a:schemeClr>
+                </a:solidFill>
+              </a:rPr>
+              <a:t>branch from develop Main Branch and must merge back to develop Main Branch</a:t>
+            </a:r>
+            <a:r>
+              <a:rPr lang="en-US" sz="1600" dirty="0" smtClean="0">
+                <a:solidFill>
+                  <a:schemeClr val="tx1">
+                    <a:lumMod val="75000"/>
+                    <a:lumOff val="25000"/>
+                  </a:schemeClr>
+                </a:solidFill>
+              </a:rPr>
+              <a:t>. </a:t>
+            </a:r>
+          </a:p>
+          <a:p>
+            <a:pPr marL="742950" lvl="1" indent="-285750">
+              <a:buFont typeface="Arial" pitchFamily="34" charset="0"/>
+              <a:buChar char="•"/>
+            </a:pPr>
+            <a:r>
+              <a:rPr lang="en-US" sz="1600" b="1" dirty="0"/>
+              <a:t>Development Deployment Branch </a:t>
+            </a:r>
+            <a:r>
+              <a:rPr lang="en-US" sz="1600" dirty="0" smtClean="0"/>
+              <a:t>– </a:t>
+            </a:r>
+            <a:r>
+              <a:rPr lang="en-US" sz="1600" dirty="0">
+                <a:solidFill>
+                  <a:schemeClr val="tx1">
+                    <a:lumMod val="75000"/>
+                    <a:lumOff val="25000"/>
+                  </a:schemeClr>
+                </a:solidFill>
+              </a:rPr>
+              <a:t>Naming convention lines up with JIRA identifier</a:t>
+            </a:r>
+            <a:r>
+              <a:rPr lang="en-US" sz="1600" dirty="0" smtClean="0"/>
+              <a:t> </a:t>
+            </a:r>
+            <a:r>
+              <a:rPr lang="en-US" sz="1600" b="1" dirty="0"/>
+              <a:t>[module name]_</a:t>
+            </a:r>
+            <a:r>
+              <a:rPr lang="en-US" sz="1600" b="1" dirty="0" err="1" smtClean="0"/>
+              <a:t>Maj_Min_Dev_Test</a:t>
+            </a:r>
+            <a:r>
+              <a:rPr lang="en-US" sz="1600" b="1" dirty="0" smtClean="0"/>
+              <a:t>. </a:t>
+            </a:r>
+            <a:r>
+              <a:rPr lang="en-US" sz="1600" dirty="0">
+                <a:solidFill>
+                  <a:schemeClr val="tx1">
+                    <a:lumMod val="75000"/>
+                    <a:lumOff val="25000"/>
+                  </a:schemeClr>
+                </a:solidFill>
+              </a:rPr>
+              <a:t>The module name is substituted with the repo name. Used by development to deliver JIRA workflow deployments for QA, Integration, Staging and production environments.</a:t>
+            </a:r>
+          </a:p>
+          <a:p>
+            <a:pPr marL="742950" lvl="1" indent="-285750">
+              <a:buFont typeface="Arial" pitchFamily="34" charset="0"/>
+              <a:buChar char="•"/>
+            </a:pPr>
+            <a:r>
+              <a:rPr lang="en-US" sz="1600" dirty="0">
+                <a:solidFill>
+                  <a:schemeClr val="tx1">
+                    <a:lumMod val="75000"/>
+                    <a:lumOff val="25000"/>
+                  </a:schemeClr>
+                </a:solidFill>
+              </a:rPr>
+              <a:t>Additional naming conventions at development discretion, less following:</a:t>
+            </a:r>
+          </a:p>
+          <a:p>
+            <a:pPr marL="1200150" lvl="2" indent="-285750">
+              <a:buFont typeface="Arial" pitchFamily="34" charset="0"/>
+              <a:buChar char="•"/>
+            </a:pPr>
+            <a:r>
+              <a:rPr lang="en-US" sz="1600" dirty="0">
+                <a:solidFill>
+                  <a:schemeClr val="tx1">
+                    <a:lumMod val="75000"/>
+                    <a:lumOff val="25000"/>
+                  </a:schemeClr>
+                </a:solidFill>
+              </a:rPr>
+              <a:t>d</a:t>
+            </a:r>
+            <a:r>
+              <a:rPr lang="en-US" sz="1600" dirty="0">
+                <a:solidFill>
+                  <a:schemeClr val="tx1">
+                    <a:lumMod val="75000"/>
+                    <a:lumOff val="25000"/>
+                  </a:schemeClr>
+                </a:solidFill>
+              </a:rPr>
+              <a:t>evelop, release*, hotfix*, master.</a:t>
+            </a:r>
+          </a:p>
+          <a:p>
+            <a:pPr marL="285750" indent="-285750">
+              <a:buFont typeface="Arial" pitchFamily="34" charset="0"/>
+              <a:buChar char="•"/>
+            </a:pPr>
+            <a:endParaRPr lang="en-US" sz="1600" dirty="0" smtClean="0"/>
+          </a:p>
+          <a:p>
+            <a:pPr marL="285750" indent="-285750">
+              <a:buFont typeface="Arial" pitchFamily="34" charset="0"/>
+              <a:buChar char="•"/>
+            </a:pPr>
+            <a:r>
+              <a:rPr lang="en-US" sz="1600" b="1" dirty="0" smtClean="0"/>
+              <a:t>Release</a:t>
+            </a:r>
+            <a:r>
+              <a:rPr lang="en-US" sz="1600" dirty="0" smtClean="0"/>
+              <a:t> - </a:t>
+            </a:r>
+            <a:r>
+              <a:rPr lang="en-US" sz="1600" dirty="0">
+                <a:solidFill>
+                  <a:schemeClr val="tx1">
+                    <a:lumMod val="75000"/>
+                    <a:lumOff val="25000"/>
+                  </a:schemeClr>
+                </a:solidFill>
+              </a:rPr>
+              <a:t>Managed by CM, should branch from develop Main Branch and must merge back into both “master” and “develop” Main Branches. Naming format is</a:t>
+            </a:r>
+            <a:r>
+              <a:rPr lang="en-US" sz="1600" dirty="0" smtClean="0"/>
+              <a:t> “</a:t>
+            </a:r>
+            <a:r>
+              <a:rPr lang="en-US" sz="1600" b="1" dirty="0" smtClean="0"/>
+              <a:t>release-YYYYMM-[A|B|OC</a:t>
+            </a:r>
+            <a:r>
+              <a:rPr lang="en-US" sz="1600" dirty="0" smtClean="0"/>
+              <a:t>]” </a:t>
+            </a:r>
+            <a:r>
+              <a:rPr lang="en-US" sz="1600" dirty="0">
+                <a:solidFill>
+                  <a:schemeClr val="tx1">
+                    <a:lumMod val="75000"/>
+                    <a:lumOff val="25000"/>
+                  </a:schemeClr>
+                </a:solidFill>
+              </a:rPr>
+              <a:t>where:</a:t>
+            </a:r>
+          </a:p>
+          <a:p>
+            <a:pPr marL="742950" lvl="1" indent="-285750">
+              <a:buFont typeface="Arial" pitchFamily="34" charset="0"/>
+              <a:buChar char="•"/>
+            </a:pPr>
+            <a:r>
+              <a:rPr lang="en-US" sz="1600" dirty="0">
+                <a:solidFill>
+                  <a:schemeClr val="tx1">
+                    <a:lumMod val="75000"/>
+                    <a:lumOff val="25000"/>
+                  </a:schemeClr>
+                </a:solidFill>
+              </a:rPr>
+              <a:t>YYYY – Current year, i.e., 2014</a:t>
+            </a:r>
+          </a:p>
+          <a:p>
+            <a:pPr marL="742950" lvl="1" indent="-285750">
+              <a:buFont typeface="Arial" pitchFamily="34" charset="0"/>
+              <a:buChar char="•"/>
+            </a:pPr>
+            <a:r>
+              <a:rPr lang="en-US" sz="1600" dirty="0">
+                <a:solidFill>
+                  <a:schemeClr val="tx1">
+                    <a:lumMod val="75000"/>
+                    <a:lumOff val="25000"/>
+                  </a:schemeClr>
+                </a:solidFill>
+              </a:rPr>
+              <a:t>MM – Current month, i.e., 01 for Jan, 02, Feb, </a:t>
+            </a:r>
+            <a:r>
+              <a:rPr lang="en-US" sz="1600" dirty="0" err="1">
+                <a:solidFill>
+                  <a:schemeClr val="tx1">
+                    <a:lumMod val="75000"/>
+                    <a:lumOff val="25000"/>
+                  </a:schemeClr>
+                </a:solidFill>
+              </a:rPr>
+              <a:t>etc</a:t>
+            </a:r>
+            <a:endParaRPr lang="en-US" sz="1600" dirty="0">
+              <a:solidFill>
+                <a:schemeClr val="tx1">
+                  <a:lumMod val="75000"/>
+                  <a:lumOff val="25000"/>
+                </a:schemeClr>
+              </a:solidFill>
+            </a:endParaRPr>
+          </a:p>
+          <a:p>
+            <a:pPr marL="742950" lvl="1" indent="-285750">
+              <a:buFont typeface="Arial" pitchFamily="34" charset="0"/>
+              <a:buChar char="•"/>
+            </a:pPr>
+            <a:r>
+              <a:rPr lang="en-US" sz="1600" dirty="0">
+                <a:solidFill>
+                  <a:schemeClr val="tx1">
+                    <a:lumMod val="75000"/>
+                    <a:lumOff val="25000"/>
+                  </a:schemeClr>
+                </a:solidFill>
+              </a:rPr>
+              <a:t>[A|B|OC] – One of “A”, “B”, or “OC” -Meaning Off-Cycle. </a:t>
+            </a:r>
+          </a:p>
+          <a:p>
+            <a:pPr marL="285750" indent="-285750">
+              <a:buFont typeface="Arial" pitchFamily="34" charset="0"/>
+              <a:buChar char="•"/>
+            </a:pPr>
+            <a:endParaRPr lang="en-US" sz="1600" dirty="0" smtClean="0"/>
+          </a:p>
+          <a:p>
+            <a:pPr marL="285750" indent="-285750">
+              <a:buFont typeface="Arial" pitchFamily="34" charset="0"/>
+              <a:buChar char="•"/>
+            </a:pPr>
+            <a:r>
+              <a:rPr lang="en-US" sz="1600" b="1" dirty="0" smtClean="0"/>
+              <a:t>Hotfix</a:t>
+            </a:r>
+            <a:r>
+              <a:rPr lang="en-US" sz="1600" dirty="0" smtClean="0"/>
+              <a:t>  - </a:t>
+            </a:r>
+            <a:r>
+              <a:rPr lang="en-US" sz="1600" dirty="0">
+                <a:solidFill>
+                  <a:schemeClr val="tx1">
+                    <a:lumMod val="75000"/>
+                    <a:lumOff val="25000"/>
+                  </a:schemeClr>
+                </a:solidFill>
+              </a:rPr>
+              <a:t>Should branch from master Main Branch.  Must merge back to master and develop main branches. Naming format is </a:t>
+            </a:r>
+            <a:r>
+              <a:rPr lang="en-US" sz="1600" dirty="0" smtClean="0"/>
+              <a:t>“</a:t>
+            </a:r>
+            <a:r>
+              <a:rPr lang="en-US" sz="1600" b="1" dirty="0" smtClean="0"/>
+              <a:t>hotfix-YYYYMM</a:t>
+            </a:r>
+            <a:r>
+              <a:rPr lang="en-US" sz="1600" dirty="0" smtClean="0"/>
+              <a:t>”.</a:t>
+            </a:r>
+            <a:endParaRPr lang="en-US" dirty="0"/>
+          </a:p>
+        </p:txBody>
+      </p:sp>
     </p:spTree>
     <p:extLst>
       <p:ext uri="{BB962C8B-B14F-4D97-AF65-F5344CB8AC3E}">
-        <p14:creationId xmlns:p14="http://schemas.microsoft.com/office/powerpoint/2010/main" val="4258256594"/>
+        <p14:creationId xmlns:p14="http://schemas.microsoft.com/office/powerpoint/2010/main" val="2801119011"/>
       </p:ext>
     </p:extLst>
   </p:cSld>
@@ -7622,64 +8692,285 @@
           <a:chExt cx="0" cy="0"/>
         </a:xfrm>
       </p:grpSpPr>
-      <p:pic>
-        <p:nvPicPr>
-          <p:cNvPr id="2" name="Picture 2"/>
-          <p:cNvPicPr>
-            <a:picLocks noChangeAspect="1" noChangeArrowheads="1"/>
-          </p:cNvPicPr>
+      <p:sp>
+        <p:nvSpPr>
+          <p:cNvPr id="2" name="Title 1"/>
+          <p:cNvSpPr>
+            <a:spLocks noGrp="1"/>
+          </p:cNvSpPr>
+          <p:nvPr>
+            <p:ph type="title"/>
+          </p:nvPr>
+        </p:nvSpPr>
+        <p:spPr>
+          <a:xfrm>
+            <a:off x="533400" y="152400"/>
+            <a:ext cx="8229600" cy="733892"/>
+          </a:xfrm>
+        </p:spPr>
+        <p:txBody>
+          <a:bodyPr>
+            <a:normAutofit/>
+          </a:bodyPr>
+          <a:lstStyle/>
+          <a:p>
+            <a:pPr lvl="1">
+              <a:spcBef>
+                <a:spcPts val="600"/>
+              </a:spcBef>
+              <a:spcAft>
+                <a:spcPts val="600"/>
+              </a:spcAft>
+            </a:pPr>
+            <a:r>
+              <a:rPr lang="en-US" sz="3600" b="1" kern="1200" dirty="0" smtClean="0">
+                <a:solidFill>
+                  <a:srgbClr val="0070C0"/>
+                </a:solidFill>
+                <a:ea typeface="+mn-ea"/>
+                <a:cs typeface="Calibri" pitchFamily="34" charset="0"/>
+              </a:rPr>
+              <a:t>Development Deployment Branches</a:t>
+            </a:r>
+            <a:endParaRPr lang="en-US" sz="3600" b="1" kern="1200" dirty="0">
+              <a:solidFill>
+                <a:srgbClr val="0070C0"/>
+              </a:solidFill>
+              <a:ea typeface="+mn-ea"/>
+              <a:cs typeface="Calibri" pitchFamily="34" charset="0"/>
+            </a:endParaRPr>
+          </a:p>
+        </p:txBody>
+      </p:sp>
+      <p:sp>
+        <p:nvSpPr>
+          <p:cNvPr id="13" name="Content Placeholder 12"/>
+          <p:cNvSpPr>
+            <a:spLocks noGrp="1"/>
+          </p:cNvSpPr>
+          <p:nvPr>
+            <p:ph idx="1"/>
+          </p:nvPr>
+        </p:nvSpPr>
+        <p:spPr>
+          <a:xfrm>
+            <a:off x="228600" y="1143000"/>
+            <a:ext cx="8763000" cy="5105400"/>
+          </a:xfrm>
+        </p:spPr>
+        <p:txBody>
+          <a:bodyPr>
+            <a:noAutofit/>
+          </a:bodyPr>
+          <a:lstStyle/>
+          <a:p>
+            <a:pPr marL="0" indent="0">
+              <a:buNone/>
+            </a:pPr>
+            <a:endParaRPr lang="en-US" sz="1800" dirty="0" smtClean="0"/>
+          </a:p>
+          <a:p>
+            <a:pPr marL="0" indent="0">
+              <a:buNone/>
+            </a:pPr>
+            <a:endParaRPr lang="en-US" sz="1800" dirty="0" smtClean="0"/>
+          </a:p>
+        </p:txBody>
+      </p:sp>
+      <p:sp>
+        <p:nvSpPr>
+          <p:cNvPr id="3" name="Rectangle 2"/>
+          <p:cNvSpPr/>
           <p:nvPr/>
-        </p:nvPicPr>
-        <p:blipFill>
-          <a:blip r:embed="rId2">
-            <a:extLst>
-              <a:ext uri="{28A0092B-C50C-407E-A947-70E740481C1C}">
-                <a14:useLocalDpi xmlns:a14="http://schemas.microsoft.com/office/drawing/2010/main" val="0"/>
-              </a:ext>
-            </a:extLst>
-          </a:blip>
-          <a:srcRect/>
-          <a:stretch>
-            <a:fillRect/>
-          </a:stretch>
-        </p:blipFill>
-        <p:spPr bwMode="auto">
+        </p:nvSpPr>
+        <p:spPr>
           <a:xfrm>
-            <a:off x="953181" y="457201"/>
-            <a:ext cx="7276419" cy="5791200"/>
+            <a:off x="533400" y="909221"/>
+            <a:ext cx="7924800" cy="5262979"/>
           </a:xfrm>
           <a:prstGeom prst="rect">
             <a:avLst/>
           </a:prstGeom>
-          <a:noFill/>
-          <a:ln>
-            <a:noFill/>
-          </a:ln>
-          <a:extLst>
-            <a:ext uri="{909E8E84-426E-40DD-AFC4-6F175D3DCCD1}">
-              <a14:hiddenFill xmlns:a14="http://schemas.microsoft.com/office/drawing/2010/main">
-                <a:solidFill>
-                  <a:schemeClr val="accent1"/>
-                </a:solidFill>
-              </a14:hiddenFill>
-            </a:ext>
-            <a:ext uri="{91240B29-F687-4F45-9708-019B960494DF}">
-              <a14:hiddenLine xmlns:a14="http://schemas.microsoft.com/office/drawing/2010/main" w="9525">
-                <a:solidFill>
-                  <a:schemeClr val="tx1"/>
-                </a:solidFill>
-                <a:miter lim="800000"/>
-                <a:headEnd/>
-                <a:tailEnd/>
-              </a14:hiddenLine>
-            </a:ext>
-          </a:extLst>
         </p:spPr>
-      </p:pic>
+        <p:txBody>
+          <a:bodyPr wrap="square">
+            <a:spAutoFit/>
+          </a:bodyPr>
+          <a:lstStyle/>
+          <a:p>
+            <a:r>
+              <a:rPr lang="en-US" sz="1400" dirty="0"/>
+              <a:t>In this organization, development work requirements are done with Rally User Stories. These User Stories are associated with JIRA tickets that are maintained in the JIRA CEMPCM project workflow. The title of JIRA tickets is maintained in the summary field of the JIRA ticket with the Rally User Story number and the module release identifier</a:t>
+            </a:r>
+            <a:r>
+              <a:rPr lang="en-US" sz="1400" dirty="0" smtClean="0"/>
+              <a:t>.</a:t>
+            </a:r>
+          </a:p>
+          <a:p>
+            <a:endParaRPr lang="en-US" sz="1400" dirty="0"/>
+          </a:p>
+          <a:p>
+            <a:pPr lvl="1"/>
+            <a:r>
+              <a:rPr lang="en-US" sz="1400" dirty="0"/>
+              <a:t>[</a:t>
+            </a:r>
+            <a:r>
+              <a:rPr lang="en-US" sz="1400" dirty="0" err="1"/>
+              <a:t>ModuleName</a:t>
+            </a:r>
+            <a:r>
+              <a:rPr lang="en-US" sz="1400" dirty="0"/>
+              <a:t>]_</a:t>
+            </a:r>
+            <a:r>
+              <a:rPr lang="en-US" sz="1400" dirty="0" smtClean="0"/>
+              <a:t>N_N_N_N</a:t>
+            </a:r>
+          </a:p>
+          <a:p>
+            <a:endParaRPr lang="en-US" sz="1400" dirty="0"/>
+          </a:p>
+          <a:p>
+            <a:r>
+              <a:rPr lang="en-US" sz="1400" dirty="0"/>
+              <a:t>The </a:t>
+            </a:r>
+            <a:r>
+              <a:rPr lang="en-US" sz="1400" b="1" dirty="0">
+                <a:hlinkClick r:id="rId3"/>
+              </a:rPr>
+              <a:t>source of record</a:t>
+            </a:r>
+            <a:r>
+              <a:rPr lang="en-US" sz="1400" dirty="0"/>
+              <a:t> for requirements is Rally. The </a:t>
+            </a:r>
+            <a:r>
+              <a:rPr lang="en-US" sz="1400" b="1" dirty="0"/>
+              <a:t>source of record</a:t>
+            </a:r>
+            <a:r>
+              <a:rPr lang="en-US" sz="1400" dirty="0"/>
+              <a:t> for deployments is the JIRA CEMPCM tickets. When developers work on and deliver EM&amp;M deployments for release outside of development to the QA, Integration, Staging, and Production environments, they do it with developer deployment branches. These are </a:t>
+            </a:r>
+            <a:r>
+              <a:rPr lang="en-US" sz="1400" dirty="0">
+                <a:hlinkClick r:id="rId4"/>
+              </a:rPr>
+              <a:t>feature branches</a:t>
+            </a:r>
+            <a:r>
+              <a:rPr lang="en-US" sz="1400" dirty="0"/>
+              <a:t>. The names of these deployment branches are the same as the module release identifier used in the JIRA ticket summary field</a:t>
+            </a:r>
+            <a:r>
+              <a:rPr lang="en-US" sz="1400" dirty="0" smtClean="0"/>
+              <a:t>.</a:t>
+            </a:r>
+          </a:p>
+          <a:p>
+            <a:endParaRPr lang="en-US" sz="1400" dirty="0"/>
+          </a:p>
+          <a:p>
+            <a:r>
+              <a:rPr lang="en-US" sz="1400" dirty="0"/>
+              <a:t>When the developer deployment branch is buildable and deployable to the development environment, it is merged with the EM&amp;M </a:t>
+            </a:r>
+            <a:r>
+              <a:rPr lang="en-US" sz="1400" dirty="0" err="1"/>
+              <a:t>git</a:t>
+            </a:r>
+            <a:r>
+              <a:rPr lang="en-US" sz="1400" dirty="0"/>
+              <a:t> system "Develop" branch. </a:t>
+            </a:r>
+            <a:r>
+              <a:rPr lang="en-US" sz="1400" b="1" dirty="0"/>
+              <a:t>This is a requirement for future build and deployment automation</a:t>
+            </a:r>
+            <a:r>
+              <a:rPr lang="en-US" sz="1400" b="1" dirty="0" smtClean="0"/>
+              <a:t>.</a:t>
+            </a:r>
+          </a:p>
+          <a:p>
+            <a:endParaRPr lang="en-US" sz="1400" dirty="0"/>
+          </a:p>
+          <a:p>
+            <a:r>
+              <a:rPr lang="en-US" sz="1400" dirty="0"/>
+              <a:t>The format of the developer deployment branch name is </a:t>
+            </a:r>
+            <a:r>
+              <a:rPr lang="en-US" sz="1400" b="1" dirty="0"/>
+              <a:t>[</a:t>
+            </a:r>
+            <a:r>
+              <a:rPr lang="en-US" sz="1400" b="1" dirty="0" err="1"/>
+              <a:t>ModuleName</a:t>
+            </a:r>
+            <a:r>
+              <a:rPr lang="en-US" sz="1400" b="1" dirty="0"/>
+              <a:t>]_N_N_N_N</a:t>
+            </a:r>
+            <a:r>
+              <a:rPr lang="en-US" sz="1400" dirty="0"/>
+              <a:t> where each </a:t>
+            </a:r>
+            <a:r>
+              <a:rPr lang="en-US" sz="1400" dirty="0" smtClean="0"/>
+              <a:t>“N" </a:t>
+            </a:r>
+            <a:r>
+              <a:rPr lang="en-US" sz="1400" dirty="0"/>
+              <a:t>is a </a:t>
+            </a:r>
+            <a:r>
+              <a:rPr lang="en-US" sz="1400" dirty="0" err="1"/>
+              <a:t>nummeric</a:t>
+            </a:r>
+            <a:r>
+              <a:rPr lang="en-US" sz="1400" dirty="0"/>
+              <a:t> increment for Major, Minor, Dev, Test. EM&amp;M Intake system record numbers and Deployment branches are used to manage EM&amp;M deployments from development, to QA, Test, and Production environments. The </a:t>
+            </a:r>
+            <a:r>
+              <a:rPr lang="en-US" sz="1400" dirty="0">
+                <a:hlinkClick r:id="rId5"/>
+              </a:rPr>
+              <a:t>EM&amp;M Workflow</a:t>
+            </a:r>
+            <a:r>
+              <a:rPr lang="en-US" sz="1400" dirty="0"/>
+              <a:t> describes how this is managed.</a:t>
+            </a:r>
+          </a:p>
+          <a:p>
+            <a:r>
+              <a:rPr lang="en-US" sz="1400" b="1" dirty="0"/>
+              <a:t>NOTE:</a:t>
+            </a:r>
+            <a:r>
+              <a:rPr lang="en-US" sz="1400" dirty="0"/>
+              <a:t> When all developer deployments are buildable and deployable before they are merged to the </a:t>
+            </a:r>
+            <a:r>
+              <a:rPr lang="en-US" sz="1400" b="1" dirty="0"/>
+              <a:t>develop</a:t>
+            </a:r>
+            <a:r>
+              <a:rPr lang="en-US" sz="1400" dirty="0"/>
+              <a:t> branch, the "Dev" and "Test" increments should be re-considered.</a:t>
+            </a:r>
+            <a:endParaRPr lang="en-US" dirty="0"/>
+          </a:p>
+        </p:txBody>
+      </p:sp>
     </p:spTree>
     <p:extLst>
       <p:ext uri="{BB962C8B-B14F-4D97-AF65-F5344CB8AC3E}">
-        <p14:creationId xmlns:p14="http://schemas.microsoft.com/office/powerpoint/2010/main" val="3208835640"/>
+        <p14:creationId xmlns:p14="http://schemas.microsoft.com/office/powerpoint/2010/main" val="3633740265"/>
       </p:ext>
     </p:extLst>
   </p:cSld>

</xml_diff>

<commit_message>
All updates made during 2015 Feb training.
</commit_message>
<xml_diff>
--- a/doc/EMM_GitSystem.pptx
+++ b/doc/EMM_GitSystem.pptx
@@ -5,7 +5,7 @@
     <p:sldMasterId id="2147483660" r:id="rId1"/>
   </p:sldMasterIdLst>
   <p:notesMasterIdLst>
-    <p:notesMasterId r:id="rId18"/>
+    <p:notesMasterId r:id="rId17"/>
   </p:notesMasterIdLst>
   <p:sldIdLst>
     <p:sldId id="257" r:id="rId2"/>
@@ -23,7 +23,6 @@
     <p:sldId id="314" r:id="rId14"/>
     <p:sldId id="315" r:id="rId15"/>
     <p:sldId id="306" r:id="rId16"/>
-    <p:sldId id="317" r:id="rId17"/>
   </p:sldIdLst>
   <p:sldSz cx="9144000" cy="6858000" type="screen4x3"/>
   <p:notesSz cx="6950075" cy="9236075"/>
@@ -207,7 +206,7 @@
           <a:p>
             <a:fld id="{596D5604-A1C4-4C80-A284-5145E3AA6E08}" type="datetimeFigureOut">
               <a:rPr lang="en-US" smtClean="0"/>
-              <a:t>10/22/2014</a:t>
+              <a:t>2/16/2015</a:t>
             </a:fld>
             <a:endParaRPr lang="en-US" dirty="0"/>
           </a:p>
@@ -5099,7 +5098,27 @@
                 <a:latin typeface="Calibri" pitchFamily="34" charset="0"/>
                 <a:cs typeface="Calibri" pitchFamily="34" charset="0"/>
               </a:rPr>
-              <a:t>EM&amp;M Git System</a:t>
+              <a:t>EM&amp;M </a:t>
+            </a:r>
+            <a:r>
+              <a:rPr lang="en-US" sz="3000" dirty="0" err="1" smtClean="0">
+                <a:solidFill>
+                  <a:srgbClr val="00BDEC"/>
+                </a:solidFill>
+                <a:latin typeface="Calibri" pitchFamily="34" charset="0"/>
+                <a:cs typeface="Calibri" pitchFamily="34" charset="0"/>
+              </a:rPr>
+              <a:t>Git</a:t>
+            </a:r>
+            <a:r>
+              <a:rPr lang="en-US" sz="3000" dirty="0" smtClean="0">
+                <a:solidFill>
+                  <a:srgbClr val="00BDEC"/>
+                </a:solidFill>
+                <a:latin typeface="Calibri" pitchFamily="34" charset="0"/>
+                <a:cs typeface="Calibri" pitchFamily="34" charset="0"/>
+              </a:rPr>
+              <a:t> System Introduction</a:t>
             </a:r>
             <a:endParaRPr lang="en-US" sz="3000" dirty="0">
               <a:solidFill>
@@ -5136,14 +5155,7 @@
                 <a:latin typeface="Calibri" pitchFamily="34" charset="0"/>
                 <a:cs typeface="Calibri" pitchFamily="34" charset="0"/>
               </a:rPr>
-              <a:t>October 21st </a:t>
-            </a:r>
-            <a:r>
-              <a:rPr lang="en-US" dirty="0" smtClean="0">
-                <a:latin typeface="Calibri" pitchFamily="34" charset="0"/>
-                <a:cs typeface="Calibri" pitchFamily="34" charset="0"/>
-              </a:rPr>
-              <a:t>2014 (Includes updates recommended at meeting)</a:t>
+              <a:t>February 10, 2015</a:t>
             </a:r>
             <a:endParaRPr lang="en-US" dirty="0">
               <a:latin typeface="Calibri" pitchFamily="34" charset="0"/>
@@ -5239,7 +5251,7 @@
                 <a:ea typeface="+mn-ea"/>
                 <a:cs typeface="Calibri" pitchFamily="34" charset="0"/>
               </a:rPr>
-              <a:t>Proposed Build Identifier</a:t>
+              <a:t>Build Identifier</a:t>
             </a:r>
             <a:endParaRPr lang="en-US" sz="3600" b="1" kern="1200" dirty="0">
               <a:solidFill>
@@ -5350,7 +5362,7 @@
                   </a:schemeClr>
                 </a:solidFill>
               </a:rPr>
-              <a:t>F – feature branch.</a:t>
+              <a:t>F – feature branch</a:t>
             </a:r>
           </a:p>
           <a:p>
@@ -5808,7 +5820,7 @@
       </p:grpSpPr>
       <p:pic>
         <p:nvPicPr>
-          <p:cNvPr id="1026" name="Picture 2"/>
+          <p:cNvPr id="3075" name="Picture 3"/>
           <p:cNvPicPr>
             <a:picLocks noChangeAspect="1" noChangeArrowheads="1"/>
           </p:cNvPicPr>
@@ -5829,8 +5841,8 @@
         </p:blipFill>
         <p:spPr bwMode="auto">
           <a:xfrm>
-            <a:off x="914400" y="286555"/>
-            <a:ext cx="7010399" cy="6023019"/>
+            <a:off x="1033463" y="609600"/>
+            <a:ext cx="7077075" cy="5838825"/>
           </a:xfrm>
           <a:prstGeom prst="rect">
             <a:avLst/>
@@ -5860,6 +5872,36 @@
           </a:extLst>
         </p:spPr>
       </p:pic>
+      <p:sp>
+        <p:nvSpPr>
+          <p:cNvPr id="2" name="TextBox 1"/>
+          <p:cNvSpPr txBox="1"/>
+          <p:nvPr/>
+        </p:nvSpPr>
+        <p:spPr>
+          <a:xfrm>
+            <a:off x="2391403" y="186829"/>
+            <a:ext cx="4361194" cy="369332"/>
+          </a:xfrm>
+          <a:prstGeom prst="rect">
+            <a:avLst/>
+          </a:prstGeom>
+          <a:noFill/>
+        </p:spPr>
+        <p:txBody>
+          <a:bodyPr wrap="none" rtlCol="0">
+            <a:spAutoFit/>
+          </a:bodyPr>
+          <a:lstStyle/>
+          <a:p>
+            <a:r>
+              <a:rPr lang="en-US" dirty="0" smtClean="0"/>
+              <a:t>Developer Builds and Tests New Feature</a:t>
+            </a:r>
+            <a:endParaRPr lang="en-US" dirty="0"/>
+          </a:p>
+        </p:txBody>
+      </p:sp>
     </p:spTree>
     <p:extLst>
       <p:ext uri="{BB962C8B-B14F-4D97-AF65-F5344CB8AC3E}">
@@ -5899,7 +5941,7 @@
       </p:grpSpPr>
       <p:pic>
         <p:nvPicPr>
-          <p:cNvPr id="2" name="Picture 2"/>
+          <p:cNvPr id="1027" name="Picture 3"/>
           <p:cNvPicPr>
             <a:picLocks noChangeAspect="1" noChangeArrowheads="1"/>
           </p:cNvPicPr>
@@ -5920,8 +5962,8 @@
         </p:blipFill>
         <p:spPr bwMode="auto">
           <a:xfrm>
-            <a:off x="953181" y="457201"/>
-            <a:ext cx="7276419" cy="5791200"/>
+            <a:off x="1071563" y="533400"/>
+            <a:ext cx="7000875" cy="5791200"/>
           </a:xfrm>
           <a:prstGeom prst="rect">
             <a:avLst/>
@@ -5990,7 +6032,7 @@
       </p:grpSpPr>
       <p:pic>
         <p:nvPicPr>
-          <p:cNvPr id="3074" name="Picture 2"/>
+          <p:cNvPr id="2051" name="Picture 3"/>
           <p:cNvPicPr>
             <a:picLocks noChangeAspect="1" noChangeArrowheads="1"/>
           </p:cNvPicPr>
@@ -6011,8 +6053,62 @@
         </p:blipFill>
         <p:spPr bwMode="auto">
           <a:xfrm>
-            <a:off x="367532" y="685801"/>
-            <a:ext cx="8395468" cy="5477612"/>
+            <a:off x="1071563" y="533400"/>
+            <a:ext cx="7000875" cy="5791200"/>
+          </a:xfrm>
+          <a:prstGeom prst="rect">
+            <a:avLst/>
+          </a:prstGeom>
+          <a:noFill/>
+          <a:ln>
+            <a:noFill/>
+          </a:ln>
+          <a:extLst>
+            <a:ext uri="{909E8E84-426E-40DD-AFC4-6F175D3DCCD1}">
+              <a14:hiddenFill xmlns:a14="http://schemas.microsoft.com/office/drawing/2010/main">
+                <a:solidFill>
+                  <a:schemeClr val="accent1"/>
+                </a:solidFill>
+              </a14:hiddenFill>
+            </a:ext>
+            <a:ext uri="{91240B29-F687-4F45-9708-019B960494DF}">
+              <a14:hiddenLine xmlns:a14="http://schemas.microsoft.com/office/drawing/2010/main" w="9525">
+                <a:solidFill>
+                  <a:schemeClr val="tx1"/>
+                </a:solidFill>
+                <a:miter lim="800000"/>
+                <a:headEnd/>
+                <a:tailEnd/>
+              </a14:hiddenLine>
+            </a:ext>
+          </a:extLst>
+        </p:spPr>
+      </p:pic>
+      <p:pic>
+        <p:nvPicPr>
+          <p:cNvPr id="1026" name="Picture 2"/>
+          <p:cNvPicPr>
+            <a:picLocks noChangeAspect="1" noChangeArrowheads="1"/>
+          </p:cNvPicPr>
+          <p:nvPr/>
+        </p:nvPicPr>
+        <p:blipFill>
+          <a:blip r:embed="rId3">
+            <a:extLst>
+              <a:ext uri="{28A0092B-C50C-407E-A947-70E740481C1C}">
+                <a14:useLocalDpi xmlns:a14="http://schemas.microsoft.com/office/drawing/2010/main" val="0"/>
+              </a:ext>
+            </a:extLst>
+          </a:blip>
+          <a:srcRect/>
+          <a:stretch>
+            <a:fillRect/>
+          </a:stretch>
+        </p:blipFill>
+        <p:spPr bwMode="auto">
+          <a:xfrm>
+            <a:off x="1076325" y="542925"/>
+            <a:ext cx="6991350" cy="5772150"/>
           </a:xfrm>
           <a:prstGeom prst="rect">
             <a:avLst/>
@@ -6153,187 +6249,6 @@
 </p:sld>
 </file>
 
-<file path=ppt/slides/slide16.xml><?xml version="1.0" encoding="utf-8"?>
-<p:sld xmlns:a="http://schemas.openxmlformats.org/drawingml/2006/main" xmlns:r="http://schemas.openxmlformats.org/officeDocument/2006/relationships" xmlns:p="http://schemas.openxmlformats.org/presentationml/2006/main">
-  <p:cSld>
-    <p:spTree>
-      <p:nvGrpSpPr>
-        <p:cNvPr id="1" name=""/>
-        <p:cNvGrpSpPr/>
-        <p:nvPr/>
-      </p:nvGrpSpPr>
-      <p:grpSpPr>
-        <a:xfrm>
-          <a:off x="0" y="0"/>
-          <a:ext cx="0" cy="0"/>
-          <a:chOff x="0" y="0"/>
-          <a:chExt cx="0" cy="0"/>
-        </a:xfrm>
-      </p:grpSpPr>
-      <p:sp>
-        <p:nvSpPr>
-          <p:cNvPr id="2" name="Title 1"/>
-          <p:cNvSpPr>
-            <a:spLocks noGrp="1"/>
-          </p:cNvSpPr>
-          <p:nvPr>
-            <p:ph type="title"/>
-          </p:nvPr>
-        </p:nvSpPr>
-        <p:spPr>
-          <a:xfrm>
-            <a:off x="533400" y="152400"/>
-            <a:ext cx="8229600" cy="1219200"/>
-          </a:xfrm>
-        </p:spPr>
-        <p:txBody>
-          <a:bodyPr>
-            <a:normAutofit/>
-          </a:bodyPr>
-          <a:lstStyle/>
-          <a:p>
-            <a:pPr lvl="1">
-              <a:spcBef>
-                <a:spcPts val="600"/>
-              </a:spcBef>
-              <a:spcAft>
-                <a:spcPts val="600"/>
-              </a:spcAft>
-            </a:pPr>
-            <a:r>
-              <a:rPr lang="en-US" sz="3600" b="1" kern="1200" dirty="0" smtClean="0">
-                <a:solidFill>
-                  <a:srgbClr val="0070C0"/>
-                </a:solidFill>
-                <a:ea typeface="+mn-ea"/>
-                <a:cs typeface="Calibri" pitchFamily="34" charset="0"/>
-              </a:rPr>
-              <a:t>Development </a:t>
-            </a:r>
-            <a:r>
-              <a:rPr lang="en-US" sz="3600" b="1" kern="1200" dirty="0" smtClean="0">
-                <a:solidFill>
-                  <a:srgbClr val="0070C0"/>
-                </a:solidFill>
-                <a:ea typeface="+mn-ea"/>
-                <a:cs typeface="Calibri" pitchFamily="34" charset="0"/>
-              </a:rPr>
-              <a:t>Challenges to</a:t>
-            </a:r>
-            <a:br>
-              <a:rPr lang="en-US" sz="3600" b="1" kern="1200" dirty="0" smtClean="0">
-                <a:solidFill>
-                  <a:srgbClr val="0070C0"/>
-                </a:solidFill>
-                <a:ea typeface="+mn-ea"/>
-                <a:cs typeface="Calibri" pitchFamily="34" charset="0"/>
-              </a:rPr>
-            </a:br>
-            <a:r>
-              <a:rPr lang="en-US" sz="3600" b="1" kern="1200" dirty="0" smtClean="0">
-                <a:solidFill>
-                  <a:srgbClr val="0070C0"/>
-                </a:solidFill>
-                <a:ea typeface="+mn-ea"/>
-                <a:cs typeface="Calibri" pitchFamily="34" charset="0"/>
-              </a:rPr>
-              <a:t>EM&amp;M Git System Branches</a:t>
-            </a:r>
-            <a:endParaRPr lang="en-US" sz="3600" b="1" kern="1200" dirty="0">
-              <a:solidFill>
-                <a:srgbClr val="0070C0"/>
-              </a:solidFill>
-              <a:ea typeface="+mn-ea"/>
-              <a:cs typeface="Calibri" pitchFamily="34" charset="0"/>
-            </a:endParaRPr>
-          </a:p>
-        </p:txBody>
-      </p:sp>
-      <p:sp>
-        <p:nvSpPr>
-          <p:cNvPr id="13" name="Content Placeholder 12"/>
-          <p:cNvSpPr>
-            <a:spLocks noGrp="1"/>
-          </p:cNvSpPr>
-          <p:nvPr>
-            <p:ph idx="1"/>
-          </p:nvPr>
-        </p:nvSpPr>
-        <p:spPr>
-          <a:xfrm>
-            <a:off x="152400" y="1066800"/>
-            <a:ext cx="8763000" cy="3962400"/>
-          </a:xfrm>
-        </p:spPr>
-        <p:txBody>
-          <a:bodyPr>
-            <a:noAutofit/>
-          </a:bodyPr>
-          <a:lstStyle/>
-          <a:p>
-            <a:pPr marL="0" indent="0">
-              <a:buNone/>
-            </a:pPr>
-            <a:endParaRPr lang="en-US" sz="1800" dirty="0" smtClean="0"/>
-          </a:p>
-          <a:p>
-            <a:pPr marL="0" indent="0">
-              <a:buNone/>
-            </a:pPr>
-            <a:endParaRPr lang="en-US" sz="1800" dirty="0"/>
-          </a:p>
-          <a:p>
-            <a:r>
-              <a:rPr lang="en-US" sz="1800" dirty="0" smtClean="0"/>
-              <a:t>The “master” branch should be “latest development” and not “latest production”.</a:t>
-            </a:r>
-          </a:p>
-          <a:p>
-            <a:endParaRPr lang="en-US" sz="1800" dirty="0" smtClean="0"/>
-          </a:p>
-          <a:p>
-            <a:r>
-              <a:rPr lang="en-US" sz="1800" dirty="0" smtClean="0"/>
-              <a:t>Retain release branches with no “master” production branch.  The “master” branch represents “latest development”.</a:t>
-            </a:r>
-          </a:p>
-          <a:p>
-            <a:endParaRPr lang="en-US" sz="1800" dirty="0" smtClean="0"/>
-          </a:p>
-          <a:p>
-            <a:r>
-              <a:rPr lang="en-US" sz="1800" dirty="0" smtClean="0"/>
-              <a:t>Retain single production branch. The “master” branch represents “latest development”.</a:t>
-            </a:r>
-          </a:p>
-          <a:p>
-            <a:pPr marL="0" indent="0">
-              <a:buNone/>
-            </a:pPr>
-            <a:endParaRPr lang="en-US" sz="1800" dirty="0" smtClean="0"/>
-          </a:p>
-        </p:txBody>
-      </p:sp>
-    </p:spTree>
-    <p:extLst>
-      <p:ext uri="{BB962C8B-B14F-4D97-AF65-F5344CB8AC3E}">
-        <p14:creationId xmlns:p14="http://schemas.microsoft.com/office/powerpoint/2010/main" val="3560427113"/>
-      </p:ext>
-    </p:extLst>
-  </p:cSld>
-  <p:clrMapOvr>
-    <a:masterClrMapping/>
-  </p:clrMapOvr>
-  <p:timing>
-    <p:tnLst>
-      <p:par>
-        <p:cTn id="1" dur="indefinite" restart="never" nodeType="tmRoot"/>
-      </p:par>
-    </p:tnLst>
-  </p:timing>
-</p:sld>
-</file>
-
 <file path=ppt/slides/slide2.xml><?xml version="1.0" encoding="utf-8"?>
 <p:sld xmlns:a="http://schemas.openxmlformats.org/drawingml/2006/main" xmlns:r="http://schemas.openxmlformats.org/officeDocument/2006/relationships" xmlns:p="http://schemas.openxmlformats.org/presentationml/2006/main">
   <p:cSld>
@@ -6488,18 +6403,7 @@
                 <a:ea typeface="+mj-ea"/>
                 <a:cs typeface="Calibri" pitchFamily="34" charset="0"/>
               </a:rPr>
-              <a:t>EM&amp;M Branch </a:t>
-            </a:r>
-            <a:r>
-              <a:rPr lang="en-US" sz="1800" dirty="0" smtClean="0">
-                <a:solidFill>
-                  <a:srgbClr val="00BDEC"/>
-                </a:solidFill>
-                <a:latin typeface="Calibri" pitchFamily="34" charset="0"/>
-                <a:ea typeface="+mj-ea"/>
-                <a:cs typeface="Calibri" pitchFamily="34" charset="0"/>
-              </a:rPr>
-              <a:t>Definitions</a:t>
+              <a:t>EM&amp;M Branch Definitions</a:t>
             </a:r>
           </a:p>
           <a:p>
@@ -6522,7 +6426,7 @@
                 <a:ea typeface="+mj-ea"/>
                 <a:cs typeface="Calibri" pitchFamily="34" charset="0"/>
               </a:rPr>
-              <a:t>Proposed Build Identifier</a:t>
+              <a:t>Build Identifier</a:t>
             </a:r>
           </a:p>
           <a:p>
@@ -6585,27 +6489,8 @@
                 <a:ea typeface="+mj-ea"/>
                 <a:cs typeface="Calibri" pitchFamily="34" charset="0"/>
               </a:rPr>
-              <a:t>Branching </a:t>
-            </a:r>
-            <a:r>
-              <a:rPr lang="en-US" sz="1800" dirty="0" smtClean="0">
-                <a:solidFill>
-                  <a:srgbClr val="00BDEC"/>
-                </a:solidFill>
-                <a:latin typeface="Calibri" pitchFamily="34" charset="0"/>
-                <a:ea typeface="+mj-ea"/>
-                <a:cs typeface="Calibri" pitchFamily="34" charset="0"/>
-              </a:rPr>
-              <a:t>Approach</a:t>
-            </a:r>
-            <a:endParaRPr lang="en-US" sz="1800" dirty="0" smtClean="0">
-              <a:solidFill>
-                <a:srgbClr val="00BDEC"/>
-              </a:solidFill>
-              <a:latin typeface="Calibri" pitchFamily="34" charset="0"/>
-              <a:ea typeface="+mj-ea"/>
-              <a:cs typeface="Calibri" pitchFamily="34" charset="0"/>
-            </a:endParaRPr>
+              <a:t>Branching Approach</a:t>
+            </a:r>
           </a:p>
           <a:p>
             <a:pPr lvl="0">
@@ -7092,18 +6977,7 @@
                 <a:ea typeface="+mj-ea"/>
                 <a:cs typeface="Calibri" pitchFamily="34" charset="0"/>
               </a:rPr>
-              <a:t>To create hotfixes to production </a:t>
-            </a:r>
-            <a:r>
-              <a:rPr lang="en-US" sz="2000" dirty="0" smtClean="0">
-                <a:solidFill>
-                  <a:srgbClr val="00BDEC"/>
-                </a:solidFill>
-                <a:latin typeface="Calibri" pitchFamily="34" charset="0"/>
-                <a:ea typeface="+mj-ea"/>
-                <a:cs typeface="Calibri" pitchFamily="34" charset="0"/>
-              </a:rPr>
-              <a:t>branches</a:t>
+              <a:t>To create hotfixes to production branches</a:t>
             </a:r>
           </a:p>
           <a:p>
@@ -7941,18 +7815,7 @@
                   </a:schemeClr>
                 </a:solidFill>
               </a:rPr>
-              <a:t>Permanently maintained providing consistent merge points (branch heads). The merge points in the EM&amp;M Git System are “develop”  (latest development) and “master” (latest production</a:t>
-            </a:r>
-            <a:r>
-              <a:rPr lang="en-US" dirty="0" smtClean="0">
-                <a:solidFill>
-                  <a:schemeClr val="tx1">
-                    <a:lumMod val="75000"/>
-                    <a:lumOff val="25000"/>
-                  </a:schemeClr>
-                </a:solidFill>
-              </a:rPr>
-              <a:t>).</a:t>
+              <a:t>Permanently maintained providing consistent merge points (branch heads). The merge points in the EM&amp;M Git System are “develop”  (latest development) and “master” (latest production).</a:t>
             </a:r>
           </a:p>
           <a:p>
@@ -8204,17 +8067,7 @@
                 <a:ea typeface="+mn-ea"/>
                 <a:cs typeface="Calibri" pitchFamily="34" charset="0"/>
               </a:rPr>
-              <a:t>EM&amp;M </a:t>
-            </a:r>
-            <a:r>
-              <a:rPr lang="en-US" sz="3600" b="1" kern="1200" dirty="0" smtClean="0">
-                <a:solidFill>
-                  <a:srgbClr val="0070C0"/>
-                </a:solidFill>
-                <a:ea typeface="+mn-ea"/>
-                <a:cs typeface="Calibri" pitchFamily="34" charset="0"/>
-              </a:rPr>
-              <a:t>Supporting Branches</a:t>
+              <a:t>EM&amp;M Supporting Branches</a:t>
             </a:r>
             <a:endParaRPr lang="en-US" sz="3600" b="1" kern="1200" dirty="0">
               <a:solidFill>
@@ -8335,11 +8188,7 @@
             </a:r>
             <a:r>
               <a:rPr lang="en-US" sz="1600" dirty="0" smtClean="0"/>
-              <a:t> </a:t>
-            </a:r>
-            <a:r>
-              <a:rPr lang="en-US" sz="1600" dirty="0" smtClean="0"/>
-              <a:t>- </a:t>
+              <a:t> - </a:t>
             </a:r>
             <a:r>
               <a:rPr lang="en-US" sz="1600" dirty="0" smtClean="0">
@@ -8350,10 +8199,24 @@
                   </a:schemeClr>
                 </a:solidFill>
               </a:rPr>
-              <a:t>Used by </a:t>
-            </a:r>
-            <a:r>
-              <a:rPr lang="en-US" sz="1600" dirty="0" smtClean="0">
+              <a:t>Used by development for all development tasks. Should branch from develop Main Branch and must merge back to develop Main Branch. </a:t>
+            </a:r>
+          </a:p>
+          <a:p>
+            <a:pPr marL="742950" lvl="1" indent="-285750">
+              <a:buFont typeface="Arial" pitchFamily="34" charset="0"/>
+              <a:buChar char="•"/>
+            </a:pPr>
+            <a:r>
+              <a:rPr lang="en-US" sz="1600" b="1" dirty="0"/>
+              <a:t>Development Deployment Branch </a:t>
+            </a:r>
+            <a:r>
+              <a:rPr lang="en-US" sz="1600" dirty="0" smtClean="0"/>
+              <a:t>– </a:t>
+            </a:r>
+            <a:r>
+              <a:rPr lang="en-US" sz="1600" dirty="0">
                 <a:solidFill>
                   <a:schemeClr val="tx1">
                     <a:lumMod val="75000"/>
@@ -8361,10 +8224,26 @@
                   </a:schemeClr>
                 </a:solidFill>
               </a:rPr>
-              <a:t>development for all development tasks. Should </a:t>
-            </a:r>
-            <a:r>
-              <a:rPr lang="en-US" sz="1600" dirty="0" smtClean="0">
+              <a:t>Naming convention lines up with JIRA identifier</a:t>
+            </a:r>
+            <a:r>
+              <a:rPr lang="en-US" sz="1600" dirty="0" smtClean="0"/>
+              <a:t> </a:t>
+            </a:r>
+            <a:r>
+              <a:rPr lang="en-US" sz="1600" b="1" dirty="0"/>
+              <a:t>[module name]_</a:t>
+            </a:r>
+            <a:r>
+              <a:rPr lang="en-US" sz="1600" b="1" dirty="0" err="1" smtClean="0"/>
+              <a:t>Maj_Min_Dev_Test</a:t>
+            </a:r>
+            <a:r>
+              <a:rPr lang="en-US" sz="1600" b="1" dirty="0" smtClean="0"/>
+              <a:t>. </a:t>
+            </a:r>
+            <a:r>
+              <a:rPr lang="en-US" sz="1600" dirty="0">
                 <a:solidFill>
                   <a:schemeClr val="tx1">
                     <a:lumMod val="75000"/>
@@ -8372,10 +8251,16 @@
                   </a:schemeClr>
                 </a:solidFill>
               </a:rPr>
-              <a:t>branch from develop Main Branch and must merge back to develop Main Branch</a:t>
-            </a:r>
-            <a:r>
-              <a:rPr lang="en-US" sz="1600" dirty="0" smtClean="0">
+              <a:t>The module name is substituted with the repo name. Used by development to deliver JIRA workflow deployments for QA, Integration, Staging and production environments.</a:t>
+            </a:r>
+          </a:p>
+          <a:p>
+            <a:pPr marL="742950" lvl="1" indent="-285750">
+              <a:buFont typeface="Arial" pitchFamily="34" charset="0"/>
+              <a:buChar char="•"/>
+            </a:pPr>
+            <a:r>
+              <a:rPr lang="en-US" sz="1600" dirty="0">
                 <a:solidFill>
                   <a:schemeClr val="tx1">
                     <a:lumMod val="75000"/>
@@ -8383,22 +8268,14 @@
                   </a:schemeClr>
                 </a:solidFill>
               </a:rPr>
-              <a:t>. </a:t>
-            </a:r>
-          </a:p>
-          <a:p>
-            <a:pPr marL="742950" lvl="1" indent="-285750">
+              <a:t>Additional naming conventions at development discretion, less following:</a:t>
+            </a:r>
+          </a:p>
+          <a:p>
+            <a:pPr marL="1200150" lvl="2" indent="-285750">
               <a:buFont typeface="Arial" pitchFamily="34" charset="0"/>
               <a:buChar char="•"/>
             </a:pPr>
-            <a:r>
-              <a:rPr lang="en-US" sz="1600" b="1" dirty="0"/>
-              <a:t>Development Deployment Branch </a:t>
-            </a:r>
-            <a:r>
-              <a:rPr lang="en-US" sz="1600" dirty="0" smtClean="0"/>
-              <a:t>– </a:t>
-            </a:r>
             <a:r>
               <a:rPr lang="en-US" sz="1600" dirty="0">
                 <a:solidFill>
@@ -8408,79 +8285,7 @@
                   </a:schemeClr>
                 </a:solidFill>
               </a:rPr>
-              <a:t>Naming convention lines up with JIRA identifier</a:t>
-            </a:r>
-            <a:r>
-              <a:rPr lang="en-US" sz="1600" dirty="0" smtClean="0"/>
-              <a:t> </a:t>
-            </a:r>
-            <a:r>
-              <a:rPr lang="en-US" sz="1600" b="1" dirty="0"/>
-              <a:t>[module name]_</a:t>
-            </a:r>
-            <a:r>
-              <a:rPr lang="en-US" sz="1600" b="1" dirty="0" err="1" smtClean="0"/>
-              <a:t>Maj_Min_Dev_Test</a:t>
-            </a:r>
-            <a:r>
-              <a:rPr lang="en-US" sz="1600" b="1" dirty="0" smtClean="0"/>
-              <a:t>. </a:t>
-            </a:r>
-            <a:r>
-              <a:rPr lang="en-US" sz="1600" dirty="0">
-                <a:solidFill>
-                  <a:schemeClr val="tx1">
-                    <a:lumMod val="75000"/>
-                    <a:lumOff val="25000"/>
-                  </a:schemeClr>
-                </a:solidFill>
-              </a:rPr>
-              <a:t>The module name is substituted with the repo name. Used by development to deliver JIRA workflow deployments for QA, Integration, Staging and production environments.</a:t>
-            </a:r>
-          </a:p>
-          <a:p>
-            <a:pPr marL="742950" lvl="1" indent="-285750">
-              <a:buFont typeface="Arial" pitchFamily="34" charset="0"/>
-              <a:buChar char="•"/>
-            </a:pPr>
-            <a:r>
-              <a:rPr lang="en-US" sz="1600" dirty="0">
-                <a:solidFill>
-                  <a:schemeClr val="tx1">
-                    <a:lumMod val="75000"/>
-                    <a:lumOff val="25000"/>
-                  </a:schemeClr>
-                </a:solidFill>
-              </a:rPr>
-              <a:t>Additional naming conventions at development discretion, less following:</a:t>
-            </a:r>
-          </a:p>
-          <a:p>
-            <a:pPr marL="1200150" lvl="2" indent="-285750">
-              <a:buFont typeface="Arial" pitchFamily="34" charset="0"/>
-              <a:buChar char="•"/>
-            </a:pPr>
-            <a:r>
-              <a:rPr lang="en-US" sz="1600" dirty="0">
-                <a:solidFill>
-                  <a:schemeClr val="tx1">
-                    <a:lumMod val="75000"/>
-                    <a:lumOff val="25000"/>
-                  </a:schemeClr>
-                </a:solidFill>
-              </a:rPr>
-              <a:t>d</a:t>
-            </a:r>
-            <a:r>
-              <a:rPr lang="en-US" sz="1600" dirty="0">
-                <a:solidFill>
-                  <a:schemeClr val="tx1">
-                    <a:lumMod val="75000"/>
-                    <a:lumOff val="25000"/>
-                  </a:schemeClr>
-                </a:solidFill>
-              </a:rPr>
-              <a:t>evelop, release*, hotfix*, master.</a:t>
+              <a:t>develop, release*, hotfix*, master.</a:t>
             </a:r>
           </a:p>
           <a:p>
@@ -8552,8 +8357,27 @@
                   </a:schemeClr>
                 </a:solidFill>
               </a:rPr>
-              <a:t>YYYY – Current year, i.e., 2014</a:t>
-            </a:r>
+              <a:t>YYYY – Current year, i.e., </a:t>
+            </a:r>
+            <a:r>
+              <a:rPr lang="en-US" sz="1600" dirty="0" smtClean="0">
+                <a:solidFill>
+                  <a:schemeClr val="tx1">
+                    <a:lumMod val="75000"/>
+                    <a:lumOff val="25000"/>
+                  </a:schemeClr>
+                </a:solidFill>
+              </a:rPr>
+              <a:t>2015</a:t>
+            </a:r>
+            <a:endParaRPr lang="en-US" sz="1600" dirty="0">
+              <a:solidFill>
+                <a:schemeClr val="tx1">
+                  <a:lumMod val="75000"/>
+                  <a:lumOff val="25000"/>
+                </a:schemeClr>
+              </a:solidFill>
+            </a:endParaRPr>
           </a:p>
           <a:p>
             <a:pPr marL="742950" lvl="1" indent="-285750">
@@ -8785,8 +8609,8 @@
         </p:nvSpPr>
         <p:spPr>
           <a:xfrm>
-            <a:off x="533400" y="909221"/>
-            <a:ext cx="7924800" cy="5262979"/>
+            <a:off x="533400" y="1161395"/>
+            <a:ext cx="7924800" cy="4401205"/>
           </a:xfrm>
           <a:prstGeom prst="rect">
             <a:avLst/>
@@ -8799,13 +8623,14 @@
           <a:lstStyle/>
           <a:p>
             <a:r>
+              <a:rPr lang="en-US" sz="1400" dirty="0" smtClean="0"/>
+              <a:t>The </a:t>
+            </a:r>
+            <a:r>
               <a:rPr lang="en-US" sz="1400" dirty="0"/>
-              <a:t>In this organization, development work requirements are done with Rally User Stories. These User Stories are associated with JIRA tickets that are maintained in the JIRA CEMPCM project workflow. The title of JIRA tickets is maintained in the summary field of the JIRA ticket with the Rally User Story number and the module release identifier</a:t>
-            </a:r>
-            <a:r>
-              <a:rPr lang="en-US" sz="1400" dirty="0" smtClean="0"/>
-              <a:t>.</a:t>
-            </a:r>
+              <a:t>Development Deployment Branch name is the module release identifier portion of the JIRA summary field. The Module name is the repo name or one of many repos related to a given Module. It format is:</a:t>
+            </a:r>
+            <a:endParaRPr lang="en-US" sz="1400" dirty="0" smtClean="0"/>
           </a:p>
           <a:p>
             <a:endParaRPr lang="en-US" sz="1400" dirty="0"/>
@@ -8863,12 +8688,9 @@
             </a:r>
             <a:r>
               <a:rPr lang="en-US" sz="1400" dirty="0"/>
-              <a:t>. The names of these deployment branches are the same as the module release identifier used in the JIRA ticket summary field</a:t>
-            </a:r>
-            <a:r>
-              <a:rPr lang="en-US" sz="1400" dirty="0" smtClean="0"/>
-              <a:t>.</a:t>
-            </a:r>
+              <a:t>. </a:t>
+            </a:r>
+            <a:endParaRPr lang="en-US" sz="1400" dirty="0" smtClean="0"/>
           </a:p>
           <a:p>
             <a:endParaRPr lang="en-US" sz="1400" dirty="0"/>
@@ -8901,39 +8723,31 @@
           <a:p>
             <a:r>
               <a:rPr lang="en-US" sz="1400" dirty="0"/>
-              <a:t>The format of the developer deployment branch name is </a:t>
-            </a:r>
-            <a:r>
-              <a:rPr lang="en-US" sz="1400" b="1" dirty="0"/>
-              <a:t>[</a:t>
-            </a:r>
-            <a:r>
-              <a:rPr lang="en-US" sz="1400" b="1" dirty="0" err="1"/>
-              <a:t>ModuleName</a:t>
-            </a:r>
-            <a:r>
-              <a:rPr lang="en-US" sz="1400" b="1" dirty="0"/>
-              <a:t>]_N_N_N_N</a:t>
-            </a:r>
-            <a:r>
-              <a:rPr lang="en-US" sz="1400" dirty="0"/>
-              <a:t> where each </a:t>
+              <a:t>E</a:t>
             </a:r>
             <a:r>
               <a:rPr lang="en-US" sz="1400" dirty="0" smtClean="0"/>
-              <a:t>“N" </a:t>
+              <a:t>ach “N" </a:t>
             </a:r>
             <a:r>
               <a:rPr lang="en-US" sz="1400" dirty="0"/>
               <a:t>is a </a:t>
             </a:r>
             <a:r>
-              <a:rPr lang="en-US" sz="1400" dirty="0" err="1"/>
-              <a:t>nummeric</a:t>
+              <a:rPr lang="en-US" sz="1400" dirty="0" smtClean="0"/>
+              <a:t>numeric </a:t>
             </a:r>
             <a:r>
               <a:rPr lang="en-US" sz="1400" dirty="0"/>
-              <a:t> increment for Major, Minor, Dev, Test. EM&amp;M Intake system record numbers and Deployment branches are used to manage EM&amp;M deployments from development, to QA, Test, and Production environments. The </a:t>
+              <a:t>increment for Major, Minor, Dev, Test. EM&amp;M </a:t>
+            </a:r>
+            <a:r>
+              <a:rPr lang="en-US" sz="1400" dirty="0" smtClean="0"/>
+              <a:t>Intake system </a:t>
+            </a:r>
+            <a:r>
+              <a:rPr lang="en-US" sz="1400" dirty="0"/>
+              <a:t>record numbers and Deployment branches are used to manage EM&amp;M deployments from development, to QA, Test, and Production environments. The </a:t>
             </a:r>
             <a:r>
               <a:rPr lang="en-US" sz="1400" dirty="0">
@@ -8947,6 +8761,7 @@
             </a:r>
           </a:p>
           <a:p>
+            <a:pPr lvl="1"/>
             <a:r>
               <a:rPr lang="en-US" sz="1400" b="1" dirty="0"/>
               <a:t>NOTE:</a:t>

</xml_diff>